<commit_message>
Xitrum Internals: Update handlers to match Xitrum 3.0
</commit_message>
<xml_diff>
--- a/presentation/xitrum_internals.pptx
+++ b/presentation/xitrum_internals.pptx
@@ -290,7 +290,7 @@
           <a:p>
             <a:fld id="{1B9F6A88-1814-7744-BE3C-4E0FD76DA6DA}" type="datetimeFigureOut">
               <a:rPr kumimoji="1" lang="ja-JP" altLang="en-US" smtClean="0"/>
-              <a:t>1/12/12</a:t>
+              <a:t>1/28/14</a:t>
             </a:fld>
             <a:endParaRPr kumimoji="1" lang="ja-JP" altLang="en-US"/>
           </a:p>
@@ -492,7 +492,7 @@
           <a:p>
             <a:fld id="{1B9F6A88-1814-7744-BE3C-4E0FD76DA6DA}" type="datetimeFigureOut">
               <a:rPr kumimoji="1" lang="ja-JP" altLang="en-US" smtClean="0"/>
-              <a:t>1/12/12</a:t>
+              <a:t>1/28/14</a:t>
             </a:fld>
             <a:endParaRPr kumimoji="1" lang="ja-JP" altLang="en-US"/>
           </a:p>
@@ -704,7 +704,7 @@
           <a:p>
             <a:fld id="{1B9F6A88-1814-7744-BE3C-4E0FD76DA6DA}" type="datetimeFigureOut">
               <a:rPr kumimoji="1" lang="ja-JP" altLang="en-US" smtClean="0"/>
-              <a:t>1/12/12</a:t>
+              <a:t>1/28/14</a:t>
             </a:fld>
             <a:endParaRPr kumimoji="1" lang="ja-JP" altLang="en-US"/>
           </a:p>
@@ -906,7 +906,7 @@
           <a:p>
             <a:fld id="{1B9F6A88-1814-7744-BE3C-4E0FD76DA6DA}" type="datetimeFigureOut">
               <a:rPr kumimoji="1" lang="ja-JP" altLang="en-US" smtClean="0"/>
-              <a:t>1/12/12</a:t>
+              <a:t>1/28/14</a:t>
             </a:fld>
             <a:endParaRPr kumimoji="1" lang="ja-JP" altLang="en-US"/>
           </a:p>
@@ -1152,7 +1152,7 @@
           <a:p>
             <a:fld id="{1B9F6A88-1814-7744-BE3C-4E0FD76DA6DA}" type="datetimeFigureOut">
               <a:rPr kumimoji="1" lang="ja-JP" altLang="en-US" smtClean="0"/>
-              <a:t>1/12/12</a:t>
+              <a:t>1/28/14</a:t>
             </a:fld>
             <a:endParaRPr kumimoji="1" lang="ja-JP" altLang="en-US"/>
           </a:p>
@@ -1504,7 +1504,7 @@
           <a:p>
             <a:fld id="{1B9F6A88-1814-7744-BE3C-4E0FD76DA6DA}" type="datetimeFigureOut">
               <a:rPr kumimoji="1" lang="ja-JP" altLang="en-US" smtClean="0"/>
-              <a:t>1/12/12</a:t>
+              <a:t>1/28/14</a:t>
             </a:fld>
             <a:endParaRPr kumimoji="1" lang="ja-JP" altLang="en-US"/>
           </a:p>
@@ -1990,7 +1990,7 @@
           <a:p>
             <a:fld id="{1B9F6A88-1814-7744-BE3C-4E0FD76DA6DA}" type="datetimeFigureOut">
               <a:rPr kumimoji="1" lang="ja-JP" altLang="en-US" smtClean="0"/>
-              <a:t>1/12/12</a:t>
+              <a:t>1/28/14</a:t>
             </a:fld>
             <a:endParaRPr kumimoji="1" lang="ja-JP" altLang="en-US"/>
           </a:p>
@@ -2108,7 +2108,7 @@
           <a:p>
             <a:fld id="{1B9F6A88-1814-7744-BE3C-4E0FD76DA6DA}" type="datetimeFigureOut">
               <a:rPr kumimoji="1" lang="ja-JP" altLang="en-US" smtClean="0"/>
-              <a:t>1/12/12</a:t>
+              <a:t>1/28/14</a:t>
             </a:fld>
             <a:endParaRPr kumimoji="1" lang="ja-JP" altLang="en-US"/>
           </a:p>
@@ -2203,7 +2203,7 @@
           <a:p>
             <a:fld id="{1B9F6A88-1814-7744-BE3C-4E0FD76DA6DA}" type="datetimeFigureOut">
               <a:rPr kumimoji="1" lang="ja-JP" altLang="en-US" smtClean="0"/>
-              <a:t>1/12/12</a:t>
+              <a:t>1/28/14</a:t>
             </a:fld>
             <a:endParaRPr kumimoji="1" lang="ja-JP" altLang="en-US"/>
           </a:p>
@@ -2512,7 +2512,7 @@
           <a:p>
             <a:fld id="{1B9F6A88-1814-7744-BE3C-4E0FD76DA6DA}" type="datetimeFigureOut">
               <a:rPr kumimoji="1" lang="ja-JP" altLang="en-US" smtClean="0"/>
-              <a:t>1/12/12</a:t>
+              <a:t>1/28/14</a:t>
             </a:fld>
             <a:endParaRPr kumimoji="1" lang="ja-JP" altLang="en-US"/>
           </a:p>
@@ -2765,7 +2765,7 @@
           <a:p>
             <a:fld id="{1B9F6A88-1814-7744-BE3C-4E0FD76DA6DA}" type="datetimeFigureOut">
               <a:rPr kumimoji="1" lang="ja-JP" altLang="en-US" smtClean="0"/>
-              <a:t>1/12/12</a:t>
+              <a:t>1/28/14</a:t>
             </a:fld>
             <a:endParaRPr kumimoji="1" lang="ja-JP" altLang="en-US"/>
           </a:p>
@@ -3010,7 +3010,7 @@
           <a:p>
             <a:fld id="{1B9F6A88-1814-7744-BE3C-4E0FD76DA6DA}" type="datetimeFigureOut">
               <a:rPr kumimoji="1" lang="ja-JP" altLang="en-US" smtClean="0"/>
-              <a:t>1/12/12</a:t>
+              <a:t>1/28/14</a:t>
             </a:fld>
             <a:endParaRPr kumimoji="1" lang="ja-JP" altLang="en-US"/>
           </a:p>
@@ -3429,7 +3429,7 @@
           <a:p>
             <a:r>
               <a:rPr kumimoji="1" lang="en-US" altLang="ja-JP" dirty="0" smtClean="0"/>
-              <a:t>1.9</a:t>
+              <a:t>3.0</a:t>
             </a:r>
             <a:endParaRPr kumimoji="1" lang="ja-JP" altLang="en-US" dirty="0"/>
           </a:p>
@@ -3465,1415 +3465,18 @@
           <a:chExt cx="0" cy="0"/>
         </a:xfrm>
       </p:grpSpPr>
-      <p:sp>
-        <p:nvSpPr>
-          <p:cNvPr id="4" name="正方形/長方形 3"/>
-          <p:cNvSpPr/>
-          <p:nvPr/>
-        </p:nvSpPr>
-        <p:spPr>
-          <a:xfrm>
-            <a:off x="2823034" y="1083607"/>
-            <a:ext cx="1324429" cy="317500"/>
-          </a:xfrm>
-          <a:prstGeom prst="rect">
-            <a:avLst/>
-          </a:prstGeom>
-        </p:spPr>
-        <p:style>
-          <a:lnRef idx="2">
-            <a:schemeClr val="accent3">
-              <a:shade val="50000"/>
-            </a:schemeClr>
-          </a:lnRef>
-          <a:fillRef idx="1">
-            <a:schemeClr val="accent3"/>
-          </a:fillRef>
-          <a:effectRef idx="0">
-            <a:schemeClr val="accent3"/>
-          </a:effectRef>
-          <a:fontRef idx="minor">
-            <a:schemeClr val="lt1"/>
-          </a:fontRef>
-        </p:style>
-        <p:txBody>
-          <a:bodyPr rtlCol="0" anchor="ctr"/>
-          <a:lstStyle/>
-          <a:p>
-            <a:pPr algn="ctr"/>
-            <a:r>
-              <a:rPr lang="en-US" altLang="ja-JP" sz="1000" dirty="0" err="1" smtClean="0"/>
-              <a:t>HttpRequestDecoder</a:t>
-            </a:r>
-            <a:endParaRPr kumimoji="1" lang="ja-JP" altLang="en-US" sz="1000" dirty="0"/>
-          </a:p>
-        </p:txBody>
-      </p:sp>
-      <p:sp>
-        <p:nvSpPr>
-          <p:cNvPr id="7" name="正方形/長方形 6"/>
-          <p:cNvSpPr/>
-          <p:nvPr/>
-        </p:nvSpPr>
-        <p:spPr>
-          <a:xfrm>
-            <a:off x="2823034" y="1480939"/>
-            <a:ext cx="1324429" cy="317500"/>
-          </a:xfrm>
-          <a:prstGeom prst="rect">
-            <a:avLst/>
-          </a:prstGeom>
-        </p:spPr>
-        <p:style>
-          <a:lnRef idx="2">
-            <a:schemeClr val="accent3">
-              <a:shade val="50000"/>
-            </a:schemeClr>
-          </a:lnRef>
-          <a:fillRef idx="1">
-            <a:schemeClr val="accent3"/>
-          </a:fillRef>
-          <a:effectRef idx="0">
-            <a:schemeClr val="accent3"/>
-          </a:effectRef>
-          <a:fontRef idx="minor">
-            <a:schemeClr val="lt1"/>
-          </a:fontRef>
-        </p:style>
-        <p:txBody>
-          <a:bodyPr rtlCol="0" anchor="ctr"/>
-          <a:lstStyle/>
-          <a:p>
-            <a:pPr algn="ctr"/>
-            <a:r>
-              <a:rPr lang="en-US" altLang="ja-JP" sz="1000" dirty="0" err="1"/>
-              <a:t>HttpChunkAggregator</a:t>
-            </a:r>
-            <a:endParaRPr kumimoji="1" lang="ja-JP" altLang="en-US" sz="1000" dirty="0"/>
-          </a:p>
-        </p:txBody>
-      </p:sp>
-      <p:sp>
-        <p:nvSpPr>
-          <p:cNvPr id="8" name="正方形/長方形 7"/>
-          <p:cNvSpPr/>
-          <p:nvPr/>
-        </p:nvSpPr>
-        <p:spPr>
-          <a:xfrm>
-            <a:off x="2823034" y="2279235"/>
-            <a:ext cx="1324429" cy="317500"/>
-          </a:xfrm>
-          <a:prstGeom prst="rect">
-            <a:avLst/>
-          </a:prstGeom>
-        </p:spPr>
-        <p:style>
-          <a:lnRef idx="1">
-            <a:schemeClr val="accent1"/>
-          </a:lnRef>
-          <a:fillRef idx="3">
-            <a:schemeClr val="accent1"/>
-          </a:fillRef>
-          <a:effectRef idx="2">
-            <a:schemeClr val="accent1"/>
-          </a:effectRef>
-          <a:fontRef idx="minor">
-            <a:schemeClr val="lt1"/>
-          </a:fontRef>
-        </p:style>
-        <p:txBody>
-          <a:bodyPr rtlCol="0" anchor="ctr"/>
-          <a:lstStyle/>
-          <a:p>
-            <a:pPr algn="ctr"/>
-            <a:r>
-              <a:rPr lang="en-US" altLang="ja-JP" sz="1000" dirty="0" err="1" smtClean="0"/>
-              <a:t>PublicFileServer</a:t>
-            </a:r>
-            <a:endParaRPr kumimoji="1" lang="ja-JP" altLang="en-US" sz="1000" dirty="0"/>
-          </a:p>
-        </p:txBody>
-      </p:sp>
-      <p:sp>
-        <p:nvSpPr>
-          <p:cNvPr id="9" name="正方形/長方形 8"/>
-          <p:cNvSpPr/>
-          <p:nvPr/>
-        </p:nvSpPr>
-        <p:spPr>
-          <a:xfrm>
-            <a:off x="4317999" y="1072720"/>
-            <a:ext cx="1324429" cy="317500"/>
-          </a:xfrm>
-          <a:prstGeom prst="rect">
-            <a:avLst/>
-          </a:prstGeom>
-        </p:spPr>
-        <p:style>
-          <a:lnRef idx="2">
-            <a:schemeClr val="accent3">
-              <a:shade val="50000"/>
-            </a:schemeClr>
-          </a:lnRef>
-          <a:fillRef idx="1">
-            <a:schemeClr val="accent3"/>
-          </a:fillRef>
-          <a:effectRef idx="0">
-            <a:schemeClr val="accent3"/>
-          </a:effectRef>
-          <a:fontRef idx="minor">
-            <a:schemeClr val="lt1"/>
-          </a:fontRef>
-        </p:style>
-        <p:txBody>
-          <a:bodyPr rtlCol="0" anchor="ctr"/>
-          <a:lstStyle/>
-          <a:p>
-            <a:pPr algn="ctr"/>
-            <a:r>
-              <a:rPr lang="en-US" altLang="ja-JP" sz="1000" dirty="0" err="1"/>
-              <a:t>HttpResponseEncoder</a:t>
-            </a:r>
-            <a:endParaRPr kumimoji="1" lang="ja-JP" altLang="en-US" sz="1000" dirty="0"/>
-          </a:p>
-        </p:txBody>
-      </p:sp>
-      <p:sp>
-        <p:nvSpPr>
-          <p:cNvPr id="10" name="正方形/長方形 9"/>
-          <p:cNvSpPr/>
-          <p:nvPr/>
-        </p:nvSpPr>
-        <p:spPr>
-          <a:xfrm>
-            <a:off x="4317999" y="1480939"/>
-            <a:ext cx="1324429" cy="317500"/>
-          </a:xfrm>
-          <a:prstGeom prst="rect">
-            <a:avLst/>
-          </a:prstGeom>
-        </p:spPr>
-        <p:style>
-          <a:lnRef idx="1">
-            <a:schemeClr val="accent1"/>
-          </a:lnRef>
-          <a:fillRef idx="3">
-            <a:schemeClr val="accent1"/>
-          </a:fillRef>
-          <a:effectRef idx="2">
-            <a:schemeClr val="accent1"/>
-          </a:effectRef>
-          <a:fontRef idx="minor">
-            <a:schemeClr val="lt1"/>
-          </a:fontRef>
-        </p:style>
-        <p:txBody>
-          <a:bodyPr rtlCol="0" anchor="ctr"/>
-          <a:lstStyle/>
-          <a:p>
-            <a:pPr algn="ctr"/>
-            <a:r>
-              <a:rPr lang="en-US" altLang="ja-JP" sz="1000" dirty="0" err="1" smtClean="0"/>
-              <a:t>XSendFile</a:t>
-            </a:r>
-            <a:endParaRPr kumimoji="1" lang="ja-JP" altLang="en-US" sz="1000" dirty="0"/>
-          </a:p>
-        </p:txBody>
-      </p:sp>
-      <p:sp>
-        <p:nvSpPr>
-          <p:cNvPr id="11" name="正方形/長方形 10"/>
-          <p:cNvSpPr/>
-          <p:nvPr/>
-        </p:nvSpPr>
-        <p:spPr>
-          <a:xfrm>
-            <a:off x="2823034" y="1878271"/>
-            <a:ext cx="1324429" cy="317500"/>
-          </a:xfrm>
-          <a:prstGeom prst="rect">
-            <a:avLst/>
-          </a:prstGeom>
-        </p:spPr>
-        <p:style>
-          <a:lnRef idx="1">
-            <a:schemeClr val="accent1"/>
-          </a:lnRef>
-          <a:fillRef idx="3">
-            <a:schemeClr val="accent1"/>
-          </a:fillRef>
-          <a:effectRef idx="2">
-            <a:schemeClr val="accent1"/>
-          </a:effectRef>
-          <a:fontRef idx="minor">
-            <a:schemeClr val="lt1"/>
-          </a:fontRef>
-        </p:style>
-        <p:txBody>
-          <a:bodyPr rtlCol="0" anchor="ctr"/>
-          <a:lstStyle/>
-          <a:p>
-            <a:pPr algn="ctr"/>
-            <a:r>
-              <a:rPr lang="en-US" altLang="ja-JP" sz="1000" dirty="0" err="1" smtClean="0"/>
-              <a:t>BaseUrlRemover</a:t>
-            </a:r>
-            <a:endParaRPr kumimoji="1" lang="ja-JP" altLang="en-US" sz="1000" dirty="0"/>
-          </a:p>
-        </p:txBody>
-      </p:sp>
-      <p:sp>
-        <p:nvSpPr>
-          <p:cNvPr id="12" name="正方形/長方形 11"/>
-          <p:cNvSpPr/>
-          <p:nvPr/>
-        </p:nvSpPr>
-        <p:spPr>
-          <a:xfrm>
-            <a:off x="2823034" y="2714666"/>
-            <a:ext cx="1324429" cy="317500"/>
-          </a:xfrm>
-          <a:prstGeom prst="rect">
-            <a:avLst/>
-          </a:prstGeom>
-        </p:spPr>
-        <p:style>
-          <a:lnRef idx="1">
-            <a:schemeClr val="accent1"/>
-          </a:lnRef>
-          <a:fillRef idx="3">
-            <a:schemeClr val="accent1"/>
-          </a:fillRef>
-          <a:effectRef idx="2">
-            <a:schemeClr val="accent1"/>
-          </a:effectRef>
-          <a:fontRef idx="minor">
-            <a:schemeClr val="lt1"/>
-          </a:fontRef>
-        </p:style>
-        <p:txBody>
-          <a:bodyPr rtlCol="0" anchor="ctr"/>
-          <a:lstStyle/>
-          <a:p>
-            <a:pPr algn="ctr"/>
-            <a:r>
-              <a:rPr lang="en-US" altLang="ja-JP" sz="1000" dirty="0" err="1" smtClean="0"/>
-              <a:t>PublicResourceServer</a:t>
-            </a:r>
-            <a:endParaRPr kumimoji="1" lang="ja-JP" altLang="en-US" sz="1000" dirty="0"/>
-          </a:p>
-        </p:txBody>
-      </p:sp>
-      <p:sp>
-        <p:nvSpPr>
-          <p:cNvPr id="13" name="正方形/長方形 12"/>
-          <p:cNvSpPr/>
-          <p:nvPr/>
-        </p:nvSpPr>
-        <p:spPr>
-          <a:xfrm>
-            <a:off x="2177142" y="6066954"/>
-            <a:ext cx="1324429" cy="546101"/>
-          </a:xfrm>
-          <a:prstGeom prst="rect">
-            <a:avLst/>
-          </a:prstGeom>
-        </p:spPr>
-        <p:style>
-          <a:lnRef idx="1">
-            <a:schemeClr val="accent6"/>
-          </a:lnRef>
-          <a:fillRef idx="3">
-            <a:schemeClr val="accent6"/>
-          </a:fillRef>
-          <a:effectRef idx="2">
-            <a:schemeClr val="accent6"/>
-          </a:effectRef>
-          <a:fontRef idx="minor">
-            <a:schemeClr val="lt1"/>
-          </a:fontRef>
-        </p:style>
-        <p:txBody>
-          <a:bodyPr rtlCol="0" anchor="ctr"/>
-          <a:lstStyle/>
-          <a:p>
-            <a:pPr algn="ctr"/>
-            <a:r>
-              <a:rPr kumimoji="1" lang="en-US" altLang="ja-JP" sz="1000" dirty="0" smtClean="0"/>
-              <a:t>Controller</a:t>
-            </a:r>
-          </a:p>
-          <a:p>
-            <a:pPr algn="ctr"/>
-            <a:r>
-              <a:rPr lang="en-US" altLang="ja-JP" sz="1000" dirty="0"/>
-              <a:t>a</a:t>
-            </a:r>
-            <a:r>
-              <a:rPr lang="en-US" altLang="ja-JP" sz="1000" dirty="0" smtClean="0"/>
-              <a:t>ction</a:t>
-            </a:r>
-          </a:p>
-          <a:p>
-            <a:pPr algn="ctr"/>
-            <a:r>
-              <a:rPr kumimoji="1" lang="en-US" altLang="ja-JP" sz="1000" dirty="0" smtClean="0"/>
-              <a:t>action</a:t>
-            </a:r>
-            <a:endParaRPr kumimoji="1" lang="ja-JP" altLang="en-US" sz="1000" dirty="0"/>
-          </a:p>
-        </p:txBody>
-      </p:sp>
-      <p:sp>
-        <p:nvSpPr>
-          <p:cNvPr id="14" name="正方形/長方形 13"/>
-          <p:cNvSpPr/>
-          <p:nvPr/>
-        </p:nvSpPr>
-        <p:spPr>
-          <a:xfrm>
-            <a:off x="3962399" y="6066954"/>
-            <a:ext cx="1324429" cy="546101"/>
-          </a:xfrm>
-          <a:prstGeom prst="rect">
-            <a:avLst/>
-          </a:prstGeom>
-        </p:spPr>
-        <p:style>
-          <a:lnRef idx="1">
-            <a:schemeClr val="accent6"/>
-          </a:lnRef>
-          <a:fillRef idx="3">
-            <a:schemeClr val="accent6"/>
-          </a:fillRef>
-          <a:effectRef idx="2">
-            <a:schemeClr val="accent6"/>
-          </a:effectRef>
-          <a:fontRef idx="minor">
-            <a:schemeClr val="lt1"/>
-          </a:fontRef>
-        </p:style>
-        <p:txBody>
-          <a:bodyPr rtlCol="0" anchor="ctr"/>
-          <a:lstStyle/>
-          <a:p>
-            <a:pPr algn="ctr"/>
-            <a:r>
-              <a:rPr kumimoji="1" lang="en-US" altLang="ja-JP" sz="1000" dirty="0" smtClean="0"/>
-              <a:t>Controller</a:t>
-            </a:r>
-          </a:p>
-          <a:p>
-            <a:pPr algn="ctr"/>
-            <a:r>
-              <a:rPr lang="en-US" altLang="ja-JP" sz="1000" dirty="0"/>
-              <a:t>a</a:t>
-            </a:r>
-            <a:r>
-              <a:rPr lang="en-US" altLang="ja-JP" sz="1000" dirty="0" smtClean="0"/>
-              <a:t>ction</a:t>
-            </a:r>
-          </a:p>
-          <a:p>
-            <a:pPr algn="ctr"/>
-            <a:r>
-              <a:rPr kumimoji="1" lang="en-US" altLang="ja-JP" sz="1000" dirty="0" smtClean="0"/>
-              <a:t>action</a:t>
-            </a:r>
-            <a:endParaRPr kumimoji="1" lang="ja-JP" altLang="en-US" sz="1000" dirty="0"/>
-          </a:p>
-        </p:txBody>
-      </p:sp>
-      <p:sp>
-        <p:nvSpPr>
-          <p:cNvPr id="17" name="正方形/長方形 16"/>
-          <p:cNvSpPr/>
-          <p:nvPr/>
-        </p:nvSpPr>
-        <p:spPr>
-          <a:xfrm>
-            <a:off x="5658751" y="6066954"/>
-            <a:ext cx="1324429" cy="546101"/>
-          </a:xfrm>
-          <a:prstGeom prst="rect">
-            <a:avLst/>
-          </a:prstGeom>
-        </p:spPr>
-        <p:style>
-          <a:lnRef idx="1">
-            <a:schemeClr val="accent6"/>
-          </a:lnRef>
-          <a:fillRef idx="3">
-            <a:schemeClr val="accent6"/>
-          </a:fillRef>
-          <a:effectRef idx="2">
-            <a:schemeClr val="accent6"/>
-          </a:effectRef>
-          <a:fontRef idx="minor">
-            <a:schemeClr val="lt1"/>
-          </a:fontRef>
-        </p:style>
-        <p:txBody>
-          <a:bodyPr rtlCol="0" anchor="ctr"/>
-          <a:lstStyle/>
-          <a:p>
-            <a:pPr algn="ctr"/>
-            <a:r>
-              <a:rPr kumimoji="1" lang="en-US" altLang="ja-JP" sz="1000" dirty="0" smtClean="0"/>
-              <a:t>Controller</a:t>
-            </a:r>
-          </a:p>
-          <a:p>
-            <a:pPr algn="ctr"/>
-            <a:r>
-              <a:rPr lang="en-US" altLang="ja-JP" sz="1000" dirty="0"/>
-              <a:t>a</a:t>
-            </a:r>
-            <a:r>
-              <a:rPr lang="en-US" altLang="ja-JP" sz="1000" dirty="0" smtClean="0"/>
-              <a:t>ction</a:t>
-            </a:r>
-          </a:p>
-          <a:p>
-            <a:pPr algn="ctr"/>
-            <a:r>
-              <a:rPr kumimoji="1" lang="en-US" altLang="ja-JP" sz="1000" dirty="0" smtClean="0"/>
-              <a:t>action</a:t>
-            </a:r>
-            <a:endParaRPr kumimoji="1" lang="ja-JP" altLang="en-US" sz="1000" dirty="0"/>
-          </a:p>
-        </p:txBody>
-      </p:sp>
-      <p:sp>
-        <p:nvSpPr>
-          <p:cNvPr id="18" name="正方形/長方形 17"/>
-          <p:cNvSpPr/>
-          <p:nvPr/>
-        </p:nvSpPr>
-        <p:spPr>
-          <a:xfrm>
-            <a:off x="2823034" y="5303651"/>
-            <a:ext cx="1324429" cy="317500"/>
-          </a:xfrm>
-          <a:prstGeom prst="rect">
-            <a:avLst/>
-          </a:prstGeom>
-        </p:spPr>
-        <p:style>
-          <a:lnRef idx="2">
-            <a:schemeClr val="accent2">
-              <a:shade val="50000"/>
-            </a:schemeClr>
-          </a:lnRef>
-          <a:fillRef idx="1">
-            <a:schemeClr val="accent2"/>
-          </a:fillRef>
-          <a:effectRef idx="0">
-            <a:schemeClr val="accent2"/>
-          </a:effectRef>
-          <a:fontRef idx="minor">
-            <a:schemeClr val="lt1"/>
-          </a:fontRef>
-        </p:style>
-        <p:txBody>
-          <a:bodyPr rtlCol="0" anchor="ctr"/>
-          <a:lstStyle/>
-          <a:p>
-            <a:pPr algn="ctr"/>
-            <a:r>
-              <a:rPr kumimoji="1" lang="en-US" altLang="ja-JP" sz="1000" dirty="0" smtClean="0"/>
-              <a:t>Dispatcher</a:t>
-            </a:r>
-            <a:endParaRPr kumimoji="1" lang="ja-JP" altLang="en-US" sz="1000" dirty="0"/>
-          </a:p>
-        </p:txBody>
-      </p:sp>
-      <p:sp>
-        <p:nvSpPr>
-          <p:cNvPr id="19" name="正方形/長方形 18"/>
-          <p:cNvSpPr/>
-          <p:nvPr/>
-        </p:nvSpPr>
-        <p:spPr>
-          <a:xfrm>
-            <a:off x="2823034" y="686958"/>
-            <a:ext cx="2819394" cy="317500"/>
-          </a:xfrm>
-          <a:prstGeom prst="rect">
-            <a:avLst/>
-          </a:prstGeom>
-        </p:spPr>
-        <p:style>
-          <a:lnRef idx="2">
-            <a:schemeClr val="accent3">
-              <a:shade val="50000"/>
-            </a:schemeClr>
-          </a:lnRef>
-          <a:fillRef idx="1">
-            <a:schemeClr val="accent3"/>
-          </a:fillRef>
-          <a:effectRef idx="0">
-            <a:schemeClr val="accent3"/>
-          </a:effectRef>
-          <a:fontRef idx="minor">
-            <a:schemeClr val="lt1"/>
-          </a:fontRef>
-        </p:style>
-        <p:txBody>
-          <a:bodyPr rtlCol="0" anchor="ctr"/>
-          <a:lstStyle/>
-          <a:p>
-            <a:pPr algn="ctr"/>
-            <a:r>
-              <a:rPr lang="en-US" altLang="ja-JP" sz="1000" dirty="0" err="1"/>
-              <a:t>SslHandler</a:t>
-            </a:r>
-            <a:endParaRPr kumimoji="1" lang="ja-JP" altLang="en-US" sz="1000" dirty="0"/>
-          </a:p>
-        </p:txBody>
-      </p:sp>
-      <p:sp>
-        <p:nvSpPr>
-          <p:cNvPr id="20" name="正方形/長方形 19"/>
-          <p:cNvSpPr/>
-          <p:nvPr/>
-        </p:nvSpPr>
-        <p:spPr>
-          <a:xfrm>
-            <a:off x="2823034" y="3157354"/>
-            <a:ext cx="1324429" cy="317500"/>
-          </a:xfrm>
-          <a:prstGeom prst="rect">
-            <a:avLst/>
-          </a:prstGeom>
-        </p:spPr>
-        <p:style>
-          <a:lnRef idx="2">
-            <a:schemeClr val="accent5">
-              <a:shade val="50000"/>
-            </a:schemeClr>
-          </a:lnRef>
-          <a:fillRef idx="1">
-            <a:schemeClr val="accent5"/>
-          </a:fillRef>
-          <a:effectRef idx="0">
-            <a:schemeClr val="accent5"/>
-          </a:effectRef>
-          <a:fontRef idx="minor">
-            <a:schemeClr val="lt1"/>
-          </a:fontRef>
-        </p:style>
-        <p:txBody>
-          <a:bodyPr rtlCol="0" anchor="ctr"/>
-          <a:lstStyle/>
-          <a:p>
-            <a:pPr algn="ctr"/>
-            <a:r>
-              <a:rPr lang="en-US" altLang="ja-JP" sz="1000" dirty="0" smtClean="0"/>
-              <a:t>Request2Env</a:t>
-            </a:r>
-            <a:endParaRPr kumimoji="1" lang="ja-JP" altLang="en-US" sz="1000" dirty="0"/>
-          </a:p>
-        </p:txBody>
-      </p:sp>
-      <p:sp>
-        <p:nvSpPr>
-          <p:cNvPr id="22" name="正方形/長方形 21"/>
-          <p:cNvSpPr/>
-          <p:nvPr/>
-        </p:nvSpPr>
-        <p:spPr>
-          <a:xfrm>
-            <a:off x="2823034" y="3597320"/>
-            <a:ext cx="1324429" cy="317500"/>
-          </a:xfrm>
-          <a:prstGeom prst="rect">
-            <a:avLst/>
-          </a:prstGeom>
-        </p:spPr>
-        <p:style>
-          <a:lnRef idx="1">
-            <a:schemeClr val="accent1"/>
-          </a:lnRef>
-          <a:fillRef idx="3">
-            <a:schemeClr val="accent1"/>
-          </a:fillRef>
-          <a:effectRef idx="2">
-            <a:schemeClr val="accent1"/>
-          </a:effectRef>
-          <a:fontRef idx="minor">
-            <a:schemeClr val="lt1"/>
-          </a:fontRef>
-        </p:style>
-        <p:txBody>
-          <a:bodyPr rtlCol="0" anchor="ctr"/>
-          <a:lstStyle/>
-          <a:p>
-            <a:pPr algn="ctr"/>
-            <a:r>
-              <a:rPr lang="en-US" altLang="ja-JP" sz="1000" dirty="0" err="1" smtClean="0"/>
-              <a:t>UriParser</a:t>
-            </a:r>
-            <a:endParaRPr kumimoji="1" lang="ja-JP" altLang="en-US" sz="1000" dirty="0"/>
-          </a:p>
-        </p:txBody>
-      </p:sp>
-      <p:sp>
-        <p:nvSpPr>
-          <p:cNvPr id="23" name="正方形/長方形 22"/>
-          <p:cNvSpPr/>
-          <p:nvPr/>
-        </p:nvSpPr>
-        <p:spPr>
-          <a:xfrm>
-            <a:off x="2823034" y="4886370"/>
-            <a:ext cx="1324429" cy="317500"/>
-          </a:xfrm>
-          <a:prstGeom prst="rect">
-            <a:avLst/>
-          </a:prstGeom>
-        </p:spPr>
-        <p:style>
-          <a:lnRef idx="2">
-            <a:schemeClr val="accent6">
-              <a:shade val="50000"/>
-            </a:schemeClr>
-          </a:lnRef>
-          <a:fillRef idx="1">
-            <a:schemeClr val="accent6"/>
-          </a:fillRef>
-          <a:effectRef idx="0">
-            <a:schemeClr val="accent6"/>
-          </a:effectRef>
-          <a:fontRef idx="minor">
-            <a:schemeClr val="lt1"/>
-          </a:fontRef>
-        </p:style>
-        <p:txBody>
-          <a:bodyPr rtlCol="0" anchor="ctr"/>
-          <a:lstStyle/>
-          <a:p>
-            <a:pPr algn="ctr"/>
-            <a:r>
-              <a:rPr lang="en-US" altLang="ja-JP" sz="1000" dirty="0" err="1" smtClean="0"/>
-              <a:t>ExecutionHandler</a:t>
-            </a:r>
-            <a:endParaRPr kumimoji="1" lang="ja-JP" altLang="en-US" sz="1000" dirty="0"/>
-          </a:p>
-        </p:txBody>
-      </p:sp>
-      <p:sp>
-        <p:nvSpPr>
-          <p:cNvPr id="24" name="正方形/長方形 23"/>
-          <p:cNvSpPr/>
-          <p:nvPr/>
-        </p:nvSpPr>
-        <p:spPr>
-          <a:xfrm>
-            <a:off x="2823033" y="4037286"/>
-            <a:ext cx="1324429" cy="317500"/>
-          </a:xfrm>
-          <a:prstGeom prst="rect">
-            <a:avLst/>
-          </a:prstGeom>
-        </p:spPr>
-        <p:style>
-          <a:lnRef idx="1">
-            <a:schemeClr val="accent1"/>
-          </a:lnRef>
-          <a:fillRef idx="3">
-            <a:schemeClr val="accent1"/>
-          </a:fillRef>
-          <a:effectRef idx="2">
-            <a:schemeClr val="accent1"/>
-          </a:effectRef>
-          <a:fontRef idx="minor">
-            <a:schemeClr val="lt1"/>
-          </a:fontRef>
-        </p:style>
-        <p:txBody>
-          <a:bodyPr rtlCol="0" anchor="ctr"/>
-          <a:lstStyle/>
-          <a:p>
-            <a:pPr algn="ctr"/>
-            <a:r>
-              <a:rPr lang="en-US" altLang="ja-JP" sz="1000" dirty="0" err="1" smtClean="0"/>
-              <a:t>BodyParser</a:t>
-            </a:r>
-            <a:endParaRPr kumimoji="1" lang="ja-JP" altLang="en-US" sz="1000" dirty="0"/>
-          </a:p>
-        </p:txBody>
-      </p:sp>
-      <p:sp>
-        <p:nvSpPr>
-          <p:cNvPr id="25" name="正方形/長方形 24"/>
-          <p:cNvSpPr/>
-          <p:nvPr/>
-        </p:nvSpPr>
-        <p:spPr>
-          <a:xfrm>
-            <a:off x="2823033" y="4463644"/>
-            <a:ext cx="1324429" cy="317500"/>
-          </a:xfrm>
-          <a:prstGeom prst="rect">
-            <a:avLst/>
-          </a:prstGeom>
-        </p:spPr>
-        <p:style>
-          <a:lnRef idx="1">
-            <a:schemeClr val="accent1"/>
-          </a:lnRef>
-          <a:fillRef idx="3">
-            <a:schemeClr val="accent1"/>
-          </a:fillRef>
-          <a:effectRef idx="2">
-            <a:schemeClr val="accent1"/>
-          </a:effectRef>
-          <a:fontRef idx="minor">
-            <a:schemeClr val="lt1"/>
-          </a:fontRef>
-        </p:style>
-        <p:txBody>
-          <a:bodyPr rtlCol="0" anchor="ctr"/>
-          <a:lstStyle/>
-          <a:p>
-            <a:pPr algn="ctr"/>
-            <a:r>
-              <a:rPr lang="en-US" altLang="ja-JP" sz="1000" dirty="0" err="1" smtClean="0"/>
-              <a:t>MethodOverrider</a:t>
-            </a:r>
-            <a:endParaRPr kumimoji="1" lang="ja-JP" altLang="en-US" sz="1000" dirty="0"/>
-          </a:p>
-        </p:txBody>
-      </p:sp>
-      <p:sp>
-        <p:nvSpPr>
-          <p:cNvPr id="26" name="正方形/長方形 25"/>
-          <p:cNvSpPr/>
-          <p:nvPr/>
-        </p:nvSpPr>
-        <p:spPr>
-          <a:xfrm>
-            <a:off x="4317999" y="1878271"/>
-            <a:ext cx="1324429" cy="317500"/>
-          </a:xfrm>
-          <a:prstGeom prst="rect">
-            <a:avLst/>
-          </a:prstGeom>
-        </p:spPr>
-        <p:style>
-          <a:lnRef idx="1">
-            <a:schemeClr val="accent1"/>
-          </a:lnRef>
-          <a:fillRef idx="3">
-            <a:schemeClr val="accent1"/>
-          </a:fillRef>
-          <a:effectRef idx="2">
-            <a:schemeClr val="accent1"/>
-          </a:effectRef>
-          <a:fontRef idx="minor">
-            <a:schemeClr val="lt1"/>
-          </a:fontRef>
-        </p:style>
-        <p:txBody>
-          <a:bodyPr rtlCol="0" anchor="ctr"/>
-          <a:lstStyle/>
-          <a:p>
-            <a:pPr algn="ctr"/>
-            <a:r>
-              <a:rPr lang="en-US" altLang="ja-JP" sz="1000" dirty="0" err="1" smtClean="0"/>
-              <a:t>XSendResource</a:t>
-            </a:r>
-            <a:endParaRPr kumimoji="1" lang="ja-JP" altLang="en-US" sz="1000" dirty="0"/>
-          </a:p>
-        </p:txBody>
-      </p:sp>
-      <p:sp>
-        <p:nvSpPr>
-          <p:cNvPr id="27" name="正方形/長方形 26"/>
-          <p:cNvSpPr/>
-          <p:nvPr/>
-        </p:nvSpPr>
-        <p:spPr>
-          <a:xfrm>
-            <a:off x="4317999" y="2279235"/>
-            <a:ext cx="1324429" cy="317500"/>
-          </a:xfrm>
-          <a:prstGeom prst="rect">
-            <a:avLst/>
-          </a:prstGeom>
-        </p:spPr>
-        <p:style>
-          <a:lnRef idx="2">
-            <a:schemeClr val="accent5">
-              <a:shade val="50000"/>
-            </a:schemeClr>
-          </a:lnRef>
-          <a:fillRef idx="1">
-            <a:schemeClr val="accent5"/>
-          </a:fillRef>
-          <a:effectRef idx="0">
-            <a:schemeClr val="accent5"/>
-          </a:effectRef>
-          <a:fontRef idx="minor">
-            <a:schemeClr val="lt1"/>
-          </a:fontRef>
-        </p:style>
-        <p:txBody>
-          <a:bodyPr rtlCol="0" anchor="ctr"/>
-          <a:lstStyle/>
-          <a:p>
-            <a:pPr algn="ctr"/>
-            <a:r>
-              <a:rPr lang="en-US" altLang="ja-JP" sz="1000" dirty="0" smtClean="0"/>
-              <a:t>Env2Response</a:t>
-            </a:r>
-            <a:endParaRPr kumimoji="1" lang="ja-JP" altLang="en-US" sz="1000" dirty="0"/>
-          </a:p>
-        </p:txBody>
-      </p:sp>
-      <p:sp>
-        <p:nvSpPr>
-          <p:cNvPr id="28" name="正方形/長方形 27"/>
-          <p:cNvSpPr/>
-          <p:nvPr/>
-        </p:nvSpPr>
-        <p:spPr>
-          <a:xfrm>
-            <a:off x="4334322" y="2714666"/>
-            <a:ext cx="1324429" cy="317500"/>
-          </a:xfrm>
-          <a:prstGeom prst="rect">
-            <a:avLst/>
-          </a:prstGeom>
-        </p:spPr>
-        <p:style>
-          <a:lnRef idx="1">
-            <a:schemeClr val="accent1"/>
-          </a:lnRef>
-          <a:fillRef idx="3">
-            <a:schemeClr val="accent1"/>
-          </a:fillRef>
-          <a:effectRef idx="2">
-            <a:schemeClr val="accent1"/>
-          </a:effectRef>
-          <a:fontRef idx="minor">
-            <a:schemeClr val="lt1"/>
-          </a:fontRef>
-        </p:style>
-        <p:txBody>
-          <a:bodyPr rtlCol="0" anchor="ctr"/>
-          <a:lstStyle/>
-          <a:p>
-            <a:pPr algn="ctr"/>
-            <a:r>
-              <a:rPr lang="en-US" altLang="ja-JP" sz="1000" dirty="0" err="1"/>
-              <a:t>R</a:t>
-            </a:r>
-            <a:r>
-              <a:rPr lang="en-US" altLang="ja-JP" sz="1000" dirty="0" err="1" smtClean="0"/>
-              <a:t>esponseCacher</a:t>
-            </a:r>
-            <a:endParaRPr kumimoji="1" lang="ja-JP" altLang="en-US" sz="1000" dirty="0"/>
-          </a:p>
-        </p:txBody>
-      </p:sp>
       <p:cxnSp>
         <p:nvCxnSpPr>
-          <p:cNvPr id="31" name="直線矢印コネクタ 30"/>
-          <p:cNvCxnSpPr/>
+          <p:cNvPr id="54" name="直線矢印コネクタ 53"/>
+          <p:cNvCxnSpPr>
+            <a:stCxn id="8" idx="2"/>
+          </p:cNvCxnSpPr>
           <p:nvPr/>
         </p:nvCxnSpPr>
         <p:spPr>
           <a:xfrm>
-            <a:off x="3501571" y="99786"/>
-            <a:ext cx="0" cy="5769428"/>
-          </a:xfrm>
-          <a:prstGeom prst="straightConnector1">
-            <a:avLst/>
-          </a:prstGeom>
-          <a:ln>
-            <a:tailEnd type="arrow"/>
-          </a:ln>
-        </p:spPr>
-        <p:style>
-          <a:lnRef idx="2">
-            <a:schemeClr val="accent2"/>
-          </a:lnRef>
-          <a:fillRef idx="0">
-            <a:schemeClr val="accent2"/>
-          </a:fillRef>
-          <a:effectRef idx="1">
-            <a:schemeClr val="accent2"/>
-          </a:effectRef>
-          <a:fontRef idx="minor">
-            <a:schemeClr val="tx1"/>
-          </a:fontRef>
-        </p:style>
-      </p:cxnSp>
-      <p:cxnSp>
-        <p:nvCxnSpPr>
-          <p:cNvPr id="33" name="直線矢印コネクタ 32"/>
-          <p:cNvCxnSpPr/>
-          <p:nvPr/>
-        </p:nvCxnSpPr>
-        <p:spPr>
-          <a:xfrm flipV="1">
-            <a:off x="4989286" y="99786"/>
-            <a:ext cx="0" cy="5769428"/>
-          </a:xfrm>
-          <a:prstGeom prst="straightConnector1">
-            <a:avLst/>
-          </a:prstGeom>
-          <a:ln>
-            <a:tailEnd type="arrow"/>
-          </a:ln>
-        </p:spPr>
-        <p:style>
-          <a:lnRef idx="2">
-            <a:schemeClr val="accent5"/>
-          </a:lnRef>
-          <a:fillRef idx="0">
-            <a:schemeClr val="accent5"/>
-          </a:fillRef>
-          <a:effectRef idx="1">
-            <a:schemeClr val="accent5"/>
-          </a:effectRef>
-          <a:fontRef idx="minor">
-            <a:schemeClr val="tx1"/>
-          </a:fontRef>
-        </p:style>
-      </p:cxnSp>
-      <p:sp>
-        <p:nvSpPr>
-          <p:cNvPr id="34" name="テキスト ボックス 33"/>
-          <p:cNvSpPr txBox="1"/>
-          <p:nvPr/>
-        </p:nvSpPr>
-        <p:spPr>
-          <a:xfrm>
-            <a:off x="2823032" y="99786"/>
-            <a:ext cx="1324429" cy="523220"/>
-          </a:xfrm>
-          <a:prstGeom prst="rect">
-            <a:avLst/>
-          </a:prstGeom>
-          <a:noFill/>
-        </p:spPr>
-        <p:txBody>
-          <a:bodyPr wrap="square" rtlCol="0">
-            <a:spAutoFit/>
-          </a:bodyPr>
-          <a:lstStyle/>
-          <a:p>
-            <a:pPr algn="ctr"/>
-            <a:r>
-              <a:rPr kumimoji="1" lang="en-US" altLang="ja-JP" sz="1400" dirty="0" smtClean="0"/>
-              <a:t>Request</a:t>
-            </a:r>
-          </a:p>
-          <a:p>
-            <a:pPr algn="ctr"/>
-            <a:r>
-              <a:rPr lang="en-US" altLang="ja-JP" sz="1400" dirty="0" smtClean="0"/>
-              <a:t>(Upstream)</a:t>
-            </a:r>
-            <a:endParaRPr kumimoji="1" lang="ja-JP" altLang="en-US" sz="1400" dirty="0"/>
-          </a:p>
-        </p:txBody>
-      </p:sp>
-      <p:sp>
-        <p:nvSpPr>
-          <p:cNvPr id="35" name="テキスト ボックス 34"/>
-          <p:cNvSpPr txBox="1"/>
-          <p:nvPr/>
-        </p:nvSpPr>
-        <p:spPr>
-          <a:xfrm>
-            <a:off x="4317999" y="99786"/>
-            <a:ext cx="1324429" cy="523220"/>
-          </a:xfrm>
-          <a:prstGeom prst="rect">
-            <a:avLst/>
-          </a:prstGeom>
-          <a:noFill/>
-        </p:spPr>
-        <p:txBody>
-          <a:bodyPr wrap="square" rtlCol="0">
-            <a:spAutoFit/>
-          </a:bodyPr>
-          <a:lstStyle/>
-          <a:p>
-            <a:pPr algn="ctr"/>
-            <a:r>
-              <a:rPr kumimoji="1" lang="en-US" altLang="ja-JP" sz="1400" dirty="0" smtClean="0"/>
-              <a:t>Response</a:t>
-            </a:r>
-          </a:p>
-          <a:p>
-            <a:pPr algn="ctr"/>
-            <a:r>
-              <a:rPr lang="en-US" altLang="ja-JP" sz="1400" dirty="0" smtClean="0"/>
-              <a:t>(Downstream)</a:t>
-            </a:r>
-            <a:endParaRPr kumimoji="1" lang="ja-JP" altLang="en-US" sz="1400" dirty="0"/>
-          </a:p>
-        </p:txBody>
-      </p:sp>
-      <p:sp>
-        <p:nvSpPr>
-          <p:cNvPr id="38" name="角丸四角形吹き出し 37"/>
-          <p:cNvSpPr/>
-          <p:nvPr/>
-        </p:nvSpPr>
-        <p:spPr>
-          <a:xfrm>
-            <a:off x="426357" y="607768"/>
-            <a:ext cx="1524000" cy="757718"/>
-          </a:xfrm>
-          <a:prstGeom prst="wedgeRoundRectCallout">
-            <a:avLst>
-              <a:gd name="adj1" fmla="val 100724"/>
-              <a:gd name="adj2" fmla="val 21022"/>
-              <a:gd name="adj3" fmla="val 16667"/>
-            </a:avLst>
-          </a:prstGeom>
-        </p:spPr>
-        <p:style>
-          <a:lnRef idx="1">
-            <a:schemeClr val="dk1"/>
-          </a:lnRef>
-          <a:fillRef idx="2">
-            <a:schemeClr val="dk1"/>
-          </a:fillRef>
-          <a:effectRef idx="1">
-            <a:schemeClr val="dk1"/>
-          </a:effectRef>
-          <a:fontRef idx="minor">
-            <a:schemeClr val="dk1"/>
-          </a:fontRef>
-        </p:style>
-        <p:txBody>
-          <a:bodyPr rtlCol="0" anchor="ctr"/>
-          <a:lstStyle/>
-          <a:p>
-            <a:r>
-              <a:rPr lang="en-US" altLang="ja-JP" sz="1200" dirty="0" smtClean="0"/>
-              <a:t>These </a:t>
-            </a:r>
-            <a:r>
-              <a:rPr lang="en-US" altLang="ja-JP" sz="1200" dirty="0" err="1" smtClean="0"/>
-              <a:t>Netty</a:t>
-            </a:r>
-            <a:r>
-              <a:rPr lang="en-US" altLang="ja-JP" sz="1200" dirty="0" smtClean="0"/>
-              <a:t> handlers are not shared</a:t>
-            </a:r>
-            <a:endParaRPr lang="ja-JP" altLang="en-US" sz="1200" dirty="0"/>
-          </a:p>
-        </p:txBody>
-      </p:sp>
-      <p:sp>
-        <p:nvSpPr>
-          <p:cNvPr id="41" name="角丸四角形吹き出し 40"/>
-          <p:cNvSpPr/>
-          <p:nvPr/>
-        </p:nvSpPr>
-        <p:spPr>
-          <a:xfrm>
-            <a:off x="5206998" y="4652320"/>
-            <a:ext cx="1355989" cy="866324"/>
-          </a:xfrm>
-          <a:prstGeom prst="wedgeRoundRectCallout">
-            <a:avLst>
-              <a:gd name="adj1" fmla="val -110028"/>
-              <a:gd name="adj2" fmla="val 93630"/>
-              <a:gd name="adj3" fmla="val 16667"/>
-            </a:avLst>
-          </a:prstGeom>
-        </p:spPr>
-        <p:style>
-          <a:lnRef idx="1">
-            <a:schemeClr val="dk1"/>
-          </a:lnRef>
-          <a:fillRef idx="2">
-            <a:schemeClr val="dk1"/>
-          </a:fillRef>
-          <a:effectRef idx="1">
-            <a:schemeClr val="dk1"/>
-          </a:effectRef>
-          <a:fontRef idx="minor">
-            <a:schemeClr val="dk1"/>
-          </a:fontRef>
-        </p:style>
-        <p:txBody>
-          <a:bodyPr rtlCol="0" anchor="ctr"/>
-          <a:lstStyle/>
-          <a:p>
-            <a:r>
-              <a:rPr lang="en-US" altLang="ja-JP" sz="1200" dirty="0" err="1" smtClean="0"/>
-              <a:t>Async</a:t>
-            </a:r>
-            <a:r>
-              <a:rPr lang="en-US" altLang="ja-JP" sz="1200" dirty="0" smtClean="0"/>
-              <a:t>:</a:t>
-            </a:r>
-          </a:p>
-          <a:p>
-            <a:r>
-              <a:rPr lang="en-US" altLang="ja-JP" sz="1200" dirty="0" smtClean="0"/>
-              <a:t>request doesn’t need immediate response</a:t>
-            </a:r>
-            <a:endParaRPr lang="ja-JP" altLang="en-US" sz="1200" dirty="0"/>
-          </a:p>
-        </p:txBody>
-      </p:sp>
-      <p:cxnSp>
-        <p:nvCxnSpPr>
-          <p:cNvPr id="44" name="直線矢印コネクタ 43"/>
-          <p:cNvCxnSpPr/>
-          <p:nvPr/>
-        </p:nvCxnSpPr>
-        <p:spPr>
-          <a:xfrm>
-            <a:off x="3501571" y="5914571"/>
-            <a:ext cx="1487715" cy="0"/>
-          </a:xfrm>
-          <a:prstGeom prst="straightConnector1">
-            <a:avLst/>
-          </a:prstGeom>
-          <a:ln>
-            <a:prstDash val="dash"/>
-            <a:tailEnd type="arrow"/>
-          </a:ln>
-        </p:spPr>
-        <p:style>
-          <a:lnRef idx="1">
-            <a:schemeClr val="dk1"/>
-          </a:lnRef>
-          <a:fillRef idx="0">
-            <a:schemeClr val="dk1"/>
-          </a:fillRef>
-          <a:effectRef idx="0">
-            <a:schemeClr val="dk1"/>
-          </a:effectRef>
-          <a:fontRef idx="minor">
-            <a:schemeClr val="tx1"/>
-          </a:fontRef>
-        </p:style>
-      </p:cxnSp>
-      <p:sp>
-        <p:nvSpPr>
-          <p:cNvPr id="46" name="角丸四角形吹き出し 45"/>
-          <p:cNvSpPr/>
-          <p:nvPr/>
-        </p:nvSpPr>
-        <p:spPr>
-          <a:xfrm>
-            <a:off x="417285" y="5003116"/>
-            <a:ext cx="1524000" cy="535231"/>
-          </a:xfrm>
-          <a:prstGeom prst="wedgeRoundRectCallout">
-            <a:avLst>
-              <a:gd name="adj1" fmla="val 100724"/>
-              <a:gd name="adj2" fmla="val 21022"/>
-              <a:gd name="adj3" fmla="val 16667"/>
-            </a:avLst>
-          </a:prstGeom>
-        </p:spPr>
-        <p:style>
-          <a:lnRef idx="1">
-            <a:schemeClr val="dk1"/>
-          </a:lnRef>
-          <a:fillRef idx="2">
-            <a:schemeClr val="dk1"/>
-          </a:fillRef>
-          <a:effectRef idx="1">
-            <a:schemeClr val="dk1"/>
-          </a:effectRef>
-          <a:fontRef idx="minor">
-            <a:schemeClr val="dk1"/>
-          </a:fontRef>
-        </p:style>
-        <p:txBody>
-          <a:bodyPr rtlCol="0" anchor="ctr"/>
-          <a:lstStyle/>
-          <a:p>
-            <a:r>
-              <a:rPr lang="en-US" altLang="ja-JP" sz="1200" dirty="0" smtClean="0"/>
-              <a:t>Routes request to controller/action</a:t>
-            </a:r>
-            <a:endParaRPr lang="ja-JP" altLang="en-US" sz="1200" dirty="0"/>
-          </a:p>
-        </p:txBody>
-      </p:sp>
-      <p:sp>
-        <p:nvSpPr>
-          <p:cNvPr id="47" name="タイトル 1"/>
-          <p:cNvSpPr>
-            <a:spLocks noGrp="1"/>
-          </p:cNvSpPr>
-          <p:nvPr>
-            <p:ph type="title"/>
-          </p:nvPr>
-        </p:nvSpPr>
-        <p:spPr>
-          <a:xfrm>
-            <a:off x="5941784" y="635576"/>
-            <a:ext cx="2866571" cy="809870"/>
-          </a:xfrm>
-        </p:spPr>
-        <p:txBody>
-          <a:bodyPr>
-            <a:normAutofit fontScale="90000"/>
-          </a:bodyPr>
-          <a:lstStyle/>
-          <a:p>
-            <a:r>
-              <a:rPr kumimoji="1" lang="en-US" altLang="ja-JP" dirty="0" smtClean="0"/>
-              <a:t>Architecture</a:t>
-            </a:r>
-            <a:endParaRPr kumimoji="1" lang="ja-JP" altLang="en-US" dirty="0"/>
-          </a:p>
-        </p:txBody>
-      </p:sp>
-      <p:sp>
-        <p:nvSpPr>
-          <p:cNvPr id="48" name="角丸四角形吹き出し 47"/>
-          <p:cNvSpPr/>
-          <p:nvPr/>
-        </p:nvSpPr>
-        <p:spPr>
-          <a:xfrm>
-            <a:off x="559497" y="2599213"/>
-            <a:ext cx="1390860" cy="974930"/>
-          </a:xfrm>
-          <a:prstGeom prst="wedgeRoundRectCallout">
-            <a:avLst>
-              <a:gd name="adj1" fmla="val 100724"/>
-              <a:gd name="adj2" fmla="val 21022"/>
-              <a:gd name="adj3" fmla="val 16667"/>
-            </a:avLst>
-          </a:prstGeom>
-        </p:spPr>
-        <p:style>
-          <a:lnRef idx="1">
-            <a:schemeClr val="dk1"/>
-          </a:lnRef>
-          <a:fillRef idx="2">
-            <a:schemeClr val="dk1"/>
-          </a:fillRef>
-          <a:effectRef idx="1">
-            <a:schemeClr val="dk1"/>
-          </a:effectRef>
-          <a:fontRef idx="minor">
-            <a:schemeClr val="dk1"/>
-          </a:fontRef>
-        </p:style>
-        <p:txBody>
-          <a:bodyPr rtlCol="0" anchor="ctr"/>
-          <a:lstStyle/>
-          <a:p>
-            <a:r>
-              <a:rPr lang="en-US" altLang="ja-JP" sz="1200" dirty="0" smtClean="0"/>
-              <a:t>Converts normal </a:t>
-            </a:r>
-            <a:r>
-              <a:rPr lang="en-US" altLang="ja-JP" sz="1200" dirty="0" err="1" smtClean="0"/>
-              <a:t>HttpRequest</a:t>
-            </a:r>
-            <a:r>
-              <a:rPr lang="en-US" altLang="ja-JP" sz="1200" dirty="0" smtClean="0"/>
-              <a:t> to </a:t>
-            </a:r>
-            <a:r>
-              <a:rPr lang="en-US" altLang="ja-JP" sz="1200" dirty="0" err="1" smtClean="0"/>
-              <a:t>Xitrum</a:t>
-            </a:r>
-            <a:r>
-              <a:rPr lang="en-US" altLang="ja-JP" sz="1200" dirty="0" smtClean="0"/>
-              <a:t> data structure</a:t>
-            </a:r>
-            <a:endParaRPr lang="ja-JP" altLang="en-US" sz="1200" dirty="0"/>
-          </a:p>
-        </p:txBody>
-      </p:sp>
-      <p:sp>
-        <p:nvSpPr>
-          <p:cNvPr id="49" name="角丸四角形吹き出し 48"/>
-          <p:cNvSpPr/>
-          <p:nvPr/>
-        </p:nvSpPr>
-        <p:spPr>
-          <a:xfrm>
-            <a:off x="6221180" y="2060870"/>
-            <a:ext cx="1327588" cy="974930"/>
-          </a:xfrm>
-          <a:prstGeom prst="wedgeRoundRectCallout">
-            <a:avLst>
-              <a:gd name="adj1" fmla="val -82609"/>
-              <a:gd name="adj2" fmla="val -20849"/>
-              <a:gd name="adj3" fmla="val 16667"/>
-            </a:avLst>
-          </a:prstGeom>
-        </p:spPr>
-        <p:style>
-          <a:lnRef idx="1">
-            <a:schemeClr val="dk1"/>
-          </a:lnRef>
-          <a:fillRef idx="2">
-            <a:schemeClr val="dk1"/>
-          </a:fillRef>
-          <a:effectRef idx="1">
-            <a:schemeClr val="dk1"/>
-          </a:effectRef>
-          <a:fontRef idx="minor">
-            <a:schemeClr val="dk1"/>
-          </a:fontRef>
-        </p:style>
-        <p:txBody>
-          <a:bodyPr rtlCol="0" anchor="ctr"/>
-          <a:lstStyle/>
-          <a:p>
-            <a:r>
-              <a:rPr lang="en-US" altLang="ja-JP" sz="1200" dirty="0" smtClean="0"/>
-              <a:t>Converts </a:t>
-            </a:r>
-            <a:r>
-              <a:rPr lang="en-US" altLang="ja-JP" sz="1200" dirty="0" err="1" smtClean="0"/>
-              <a:t>Xitrum</a:t>
-            </a:r>
-            <a:r>
-              <a:rPr lang="en-US" altLang="ja-JP" sz="1200" dirty="0" smtClean="0"/>
-              <a:t> data structure</a:t>
-            </a:r>
-            <a:r>
-              <a:rPr lang="en-US" altLang="ja-JP" sz="1200" dirty="0"/>
-              <a:t> </a:t>
-            </a:r>
-            <a:r>
-              <a:rPr lang="en-US" altLang="ja-JP" sz="1200" dirty="0" smtClean="0"/>
-              <a:t>to normal </a:t>
-            </a:r>
-            <a:r>
-              <a:rPr lang="en-US" altLang="ja-JP" sz="1200" dirty="0" err="1" smtClean="0"/>
-              <a:t>HttpResponse</a:t>
-            </a:r>
-            <a:endParaRPr lang="ja-JP" altLang="en-US" sz="1200" dirty="0"/>
-          </a:p>
-        </p:txBody>
-      </p:sp>
-      <p:cxnSp>
-        <p:nvCxnSpPr>
-          <p:cNvPr id="50" name="直線矢印コネクタ 49"/>
-          <p:cNvCxnSpPr/>
-          <p:nvPr/>
-        </p:nvCxnSpPr>
-        <p:spPr>
-          <a:xfrm>
-            <a:off x="3501571" y="5310565"/>
-            <a:ext cx="1487715" cy="488430"/>
+            <a:off x="3937801" y="3975860"/>
+            <a:ext cx="1487715" cy="1785248"/>
           </a:xfrm>
           <a:prstGeom prst="straightConnector1">
             <a:avLst/>
@@ -4900,53 +3503,812 @@
       </p:cxnSp>
       <p:cxnSp>
         <p:nvCxnSpPr>
-          <p:cNvPr id="54" name="直線矢印コネクタ 53"/>
+          <p:cNvPr id="33" name="直線矢印コネクタ 32"/>
           <p:cNvCxnSpPr/>
           <p:nvPr/>
         </p:nvCxnSpPr>
         <p:spPr>
-          <a:xfrm>
-            <a:off x="3501571" y="2954065"/>
-            <a:ext cx="1487715" cy="2729483"/>
+          <a:xfrm flipV="1">
+            <a:off x="5425516" y="177346"/>
+            <a:ext cx="0" cy="6360886"/>
           </a:xfrm>
           <a:prstGeom prst="straightConnector1">
             <a:avLst/>
           </a:prstGeom>
           <a:ln>
-            <a:prstDash val="dash"/>
             <a:tailEnd type="arrow"/>
           </a:ln>
         </p:spPr>
         <p:style>
-          <a:lnRef idx="1">
-            <a:schemeClr val="dk1"/>
+          <a:lnRef idx="2">
+            <a:schemeClr val="accent5"/>
           </a:lnRef>
           <a:fillRef idx="0">
-            <a:schemeClr val="dk1"/>
+            <a:schemeClr val="accent5"/>
           </a:fillRef>
-          <a:effectRef idx="0">
-            <a:schemeClr val="dk1"/>
+          <a:effectRef idx="1">
+            <a:schemeClr val="accent5"/>
           </a:effectRef>
           <a:fontRef idx="minor">
             <a:schemeClr val="tx1"/>
           </a:fontRef>
         </p:style>
       </p:cxnSp>
-      <p:sp>
-        <p:nvSpPr>
-          <p:cNvPr id="57" name="角丸四角形吹き出し 56"/>
+      <p:cxnSp>
+        <p:nvCxnSpPr>
+          <p:cNvPr id="31" name="直線矢印コネクタ 30"/>
+          <p:cNvCxnSpPr/>
+          <p:nvPr/>
+        </p:nvCxnSpPr>
+        <p:spPr>
+          <a:xfrm>
+            <a:off x="3937801" y="177346"/>
+            <a:ext cx="0" cy="6360886"/>
+          </a:xfrm>
+          <a:prstGeom prst="straightConnector1">
+            <a:avLst/>
+          </a:prstGeom>
+          <a:ln>
+            <a:tailEnd type="arrow"/>
+          </a:ln>
+        </p:spPr>
+        <p:style>
+          <a:lnRef idx="2">
+            <a:schemeClr val="accent2"/>
+          </a:lnRef>
+          <a:fillRef idx="0">
+            <a:schemeClr val="accent2"/>
+          </a:fillRef>
+          <a:effectRef idx="1">
+            <a:schemeClr val="accent2"/>
+          </a:effectRef>
+          <a:fontRef idx="minor">
+            <a:schemeClr val="tx1"/>
+          </a:fontRef>
+        </p:style>
+      </p:cxnSp>
+      <p:sp>
+        <p:nvSpPr>
+          <p:cNvPr id="4" name="正方形/長方形 3"/>
           <p:cNvSpPr/>
           <p:nvPr/>
         </p:nvSpPr>
         <p:spPr>
           <a:xfrm>
-            <a:off x="5796320" y="3474854"/>
-            <a:ext cx="2152088" cy="592435"/>
+            <a:off x="3259264" y="1161167"/>
+            <a:ext cx="1324429" cy="317500"/>
+          </a:xfrm>
+          <a:prstGeom prst="rect">
+            <a:avLst/>
+          </a:prstGeom>
+        </p:spPr>
+        <p:style>
+          <a:lnRef idx="2">
+            <a:schemeClr val="accent4">
+              <a:shade val="50000"/>
+            </a:schemeClr>
+          </a:lnRef>
+          <a:fillRef idx="1">
+            <a:schemeClr val="accent4"/>
+          </a:fillRef>
+          <a:effectRef idx="0">
+            <a:schemeClr val="accent4"/>
+          </a:effectRef>
+          <a:fontRef idx="minor">
+            <a:schemeClr val="lt1"/>
+          </a:fontRef>
+        </p:style>
+        <p:txBody>
+          <a:bodyPr rtlCol="0" anchor="ctr"/>
+          <a:lstStyle/>
+          <a:p>
+            <a:pPr algn="ctr"/>
+            <a:r>
+              <a:rPr lang="en-US" altLang="ja-JP" sz="1000" dirty="0" err="1" smtClean="0"/>
+              <a:t>FlashSocketPolicy</a:t>
+            </a:r>
+            <a:endParaRPr kumimoji="1" lang="ja-JP" altLang="en-US" sz="1000" dirty="0"/>
+          </a:p>
+        </p:txBody>
+      </p:sp>
+      <p:sp>
+        <p:nvSpPr>
+          <p:cNvPr id="7" name="正方形/長方形 6"/>
+          <p:cNvSpPr/>
+          <p:nvPr/>
+        </p:nvSpPr>
+        <p:spPr>
+          <a:xfrm>
+            <a:off x="3259264" y="1558499"/>
+            <a:ext cx="1324429" cy="317500"/>
+          </a:xfrm>
+          <a:prstGeom prst="rect">
+            <a:avLst/>
+          </a:prstGeom>
+        </p:spPr>
+        <p:style>
+          <a:lnRef idx="2">
+            <a:schemeClr val="accent3">
+              <a:shade val="50000"/>
+            </a:schemeClr>
+          </a:lnRef>
+          <a:fillRef idx="1">
+            <a:schemeClr val="accent3"/>
+          </a:fillRef>
+          <a:effectRef idx="0">
+            <a:schemeClr val="accent3"/>
+          </a:effectRef>
+          <a:fontRef idx="minor">
+            <a:schemeClr val="lt1"/>
+          </a:fontRef>
+        </p:style>
+        <p:txBody>
+          <a:bodyPr rtlCol="0" anchor="ctr"/>
+          <a:lstStyle/>
+          <a:p>
+            <a:pPr algn="ctr"/>
+            <a:r>
+              <a:rPr lang="en-US" altLang="ja-JP" sz="1000" dirty="0" err="1"/>
+              <a:t>HttpRequestDecoder</a:t>
+            </a:r>
+            <a:endParaRPr kumimoji="1" lang="ja-JP" altLang="en-US" sz="1000" dirty="0"/>
+          </a:p>
+        </p:txBody>
+      </p:sp>
+      <p:sp>
+        <p:nvSpPr>
+          <p:cNvPr id="8" name="正方形/長方形 7"/>
+          <p:cNvSpPr/>
+          <p:nvPr/>
+        </p:nvSpPr>
+        <p:spPr>
+          <a:xfrm>
+            <a:off x="3275586" y="3658360"/>
+            <a:ext cx="1324429" cy="317500"/>
+          </a:xfrm>
+          <a:prstGeom prst="rect">
+            <a:avLst/>
+          </a:prstGeom>
+        </p:spPr>
+        <p:style>
+          <a:lnRef idx="1">
+            <a:schemeClr val="accent1"/>
+          </a:lnRef>
+          <a:fillRef idx="3">
+            <a:schemeClr val="accent1"/>
+          </a:fillRef>
+          <a:effectRef idx="2">
+            <a:schemeClr val="accent1"/>
+          </a:effectRef>
+          <a:fontRef idx="minor">
+            <a:schemeClr val="lt1"/>
+          </a:fontRef>
+        </p:style>
+        <p:txBody>
+          <a:bodyPr rtlCol="0" anchor="ctr"/>
+          <a:lstStyle/>
+          <a:p>
+            <a:pPr algn="ctr"/>
+            <a:r>
+              <a:rPr lang="en-US" altLang="ja-JP" sz="1000" dirty="0" err="1" smtClean="0"/>
+              <a:t>PublicFileServer</a:t>
+            </a:r>
+            <a:endParaRPr kumimoji="1" lang="ja-JP" altLang="en-US" sz="1000" dirty="0"/>
+          </a:p>
+        </p:txBody>
+      </p:sp>
+      <p:sp>
+        <p:nvSpPr>
+          <p:cNvPr id="9" name="正方形/長方形 8"/>
+          <p:cNvSpPr/>
+          <p:nvPr/>
+        </p:nvSpPr>
+        <p:spPr>
+          <a:xfrm>
+            <a:off x="4754229" y="1150280"/>
+            <a:ext cx="1324429" cy="317500"/>
+          </a:xfrm>
+          <a:prstGeom prst="rect">
+            <a:avLst/>
+          </a:prstGeom>
+        </p:spPr>
+        <p:style>
+          <a:lnRef idx="2">
+            <a:schemeClr val="accent3">
+              <a:shade val="50000"/>
+            </a:schemeClr>
+          </a:lnRef>
+          <a:fillRef idx="1">
+            <a:schemeClr val="accent3"/>
+          </a:fillRef>
+          <a:effectRef idx="0">
+            <a:schemeClr val="accent3"/>
+          </a:effectRef>
+          <a:fontRef idx="minor">
+            <a:schemeClr val="lt1"/>
+          </a:fontRef>
+        </p:style>
+        <p:txBody>
+          <a:bodyPr rtlCol="0" anchor="ctr"/>
+          <a:lstStyle/>
+          <a:p>
+            <a:pPr algn="ctr"/>
+            <a:r>
+              <a:rPr lang="en-US" altLang="ja-JP" sz="1000" dirty="0" err="1"/>
+              <a:t>HttpResponseEncoder</a:t>
+            </a:r>
+            <a:endParaRPr kumimoji="1" lang="ja-JP" altLang="en-US" sz="1000" dirty="0"/>
+          </a:p>
+        </p:txBody>
+      </p:sp>
+      <p:sp>
+        <p:nvSpPr>
+          <p:cNvPr id="10" name="正方形/長方形 9"/>
+          <p:cNvSpPr/>
+          <p:nvPr/>
+        </p:nvSpPr>
+        <p:spPr>
+          <a:xfrm>
+            <a:off x="4754229" y="3658360"/>
+            <a:ext cx="1324429" cy="317500"/>
+          </a:xfrm>
+          <a:prstGeom prst="rect">
+            <a:avLst/>
+          </a:prstGeom>
+        </p:spPr>
+        <p:style>
+          <a:lnRef idx="1">
+            <a:schemeClr val="accent1"/>
+          </a:lnRef>
+          <a:fillRef idx="3">
+            <a:schemeClr val="accent1"/>
+          </a:fillRef>
+          <a:effectRef idx="2">
+            <a:schemeClr val="accent1"/>
+          </a:effectRef>
+          <a:fontRef idx="minor">
+            <a:schemeClr val="lt1"/>
+          </a:fontRef>
+        </p:style>
+        <p:txBody>
+          <a:bodyPr rtlCol="0" anchor="ctr"/>
+          <a:lstStyle/>
+          <a:p>
+            <a:pPr algn="ctr"/>
+            <a:r>
+              <a:rPr lang="en-US" altLang="ja-JP" sz="1000" dirty="0" err="1" smtClean="0"/>
+              <a:t>XSendFile</a:t>
+            </a:r>
+            <a:endParaRPr kumimoji="1" lang="ja-JP" altLang="en-US" sz="1000" dirty="0"/>
+          </a:p>
+        </p:txBody>
+      </p:sp>
+      <p:sp>
+        <p:nvSpPr>
+          <p:cNvPr id="11" name="正方形/長方形 10"/>
+          <p:cNvSpPr/>
+          <p:nvPr/>
+        </p:nvSpPr>
+        <p:spPr>
+          <a:xfrm>
+            <a:off x="3259262" y="2795860"/>
+            <a:ext cx="1324429" cy="317500"/>
+          </a:xfrm>
+          <a:prstGeom prst="rect">
+            <a:avLst/>
+          </a:prstGeom>
+        </p:spPr>
+        <p:style>
+          <a:lnRef idx="1">
+            <a:schemeClr val="accent1"/>
+          </a:lnRef>
+          <a:fillRef idx="3">
+            <a:schemeClr val="accent1"/>
+          </a:fillRef>
+          <a:effectRef idx="2">
+            <a:schemeClr val="accent1"/>
+          </a:effectRef>
+          <a:fontRef idx="minor">
+            <a:schemeClr val="lt1"/>
+          </a:fontRef>
+        </p:style>
+        <p:txBody>
+          <a:bodyPr rtlCol="0" anchor="ctr"/>
+          <a:lstStyle/>
+          <a:p>
+            <a:pPr algn="ctr"/>
+            <a:r>
+              <a:rPr lang="en-US" altLang="ja-JP" sz="1000" dirty="0" err="1" smtClean="0"/>
+              <a:t>BaseUrlRemover</a:t>
+            </a:r>
+            <a:endParaRPr kumimoji="1" lang="ja-JP" altLang="en-US" sz="1000" dirty="0"/>
+          </a:p>
+        </p:txBody>
+      </p:sp>
+      <p:sp>
+        <p:nvSpPr>
+          <p:cNvPr id="12" name="正方形/長方形 11"/>
+          <p:cNvSpPr/>
+          <p:nvPr/>
+        </p:nvSpPr>
+        <p:spPr>
+          <a:xfrm>
+            <a:off x="3275586" y="4113368"/>
+            <a:ext cx="1324429" cy="317500"/>
+          </a:xfrm>
+          <a:prstGeom prst="rect">
+            <a:avLst/>
+          </a:prstGeom>
+        </p:spPr>
+        <p:style>
+          <a:lnRef idx="1">
+            <a:schemeClr val="accent1"/>
+          </a:lnRef>
+          <a:fillRef idx="3">
+            <a:schemeClr val="accent1"/>
+          </a:fillRef>
+          <a:effectRef idx="2">
+            <a:schemeClr val="accent1"/>
+          </a:effectRef>
+          <a:fontRef idx="minor">
+            <a:schemeClr val="lt1"/>
+          </a:fontRef>
+        </p:style>
+        <p:txBody>
+          <a:bodyPr rtlCol="0" anchor="ctr"/>
+          <a:lstStyle/>
+          <a:p>
+            <a:pPr algn="ctr"/>
+            <a:r>
+              <a:rPr lang="en-US" altLang="ja-JP" sz="1000" dirty="0" err="1" smtClean="0"/>
+              <a:t>PublicResourceServer</a:t>
+            </a:r>
+            <a:endParaRPr kumimoji="1" lang="ja-JP" altLang="en-US" sz="1000" dirty="0"/>
+          </a:p>
+        </p:txBody>
+      </p:sp>
+      <p:sp>
+        <p:nvSpPr>
+          <p:cNvPr id="18" name="正方形/長方形 17"/>
+          <p:cNvSpPr/>
+          <p:nvPr/>
+        </p:nvSpPr>
+        <p:spPr>
+          <a:xfrm>
+            <a:off x="3259264" y="5381211"/>
+            <a:ext cx="1324429" cy="317500"/>
+          </a:xfrm>
+          <a:prstGeom prst="rect">
+            <a:avLst/>
+          </a:prstGeom>
+          <a:solidFill>
+            <a:srgbClr val="008000"/>
+          </a:solidFill>
+        </p:spPr>
+        <p:style>
+          <a:lnRef idx="2">
+            <a:schemeClr val="accent2">
+              <a:shade val="50000"/>
+            </a:schemeClr>
+          </a:lnRef>
+          <a:fillRef idx="1">
+            <a:schemeClr val="accent2"/>
+          </a:fillRef>
+          <a:effectRef idx="0">
+            <a:schemeClr val="accent2"/>
+          </a:effectRef>
+          <a:fontRef idx="minor">
+            <a:schemeClr val="lt1"/>
+          </a:fontRef>
+        </p:style>
+        <p:txBody>
+          <a:bodyPr rtlCol="0" anchor="ctr"/>
+          <a:lstStyle/>
+          <a:p>
+            <a:pPr algn="ctr"/>
+            <a:r>
+              <a:rPr kumimoji="1" lang="en-US" altLang="ja-JP" sz="1000" dirty="0" smtClean="0"/>
+              <a:t>Dispatcher</a:t>
+            </a:r>
+            <a:endParaRPr kumimoji="1" lang="ja-JP" altLang="en-US" sz="1000" dirty="0"/>
+          </a:p>
+        </p:txBody>
+      </p:sp>
+      <p:sp>
+        <p:nvSpPr>
+          <p:cNvPr id="19" name="正方形/長方形 18"/>
+          <p:cNvSpPr/>
+          <p:nvPr/>
+        </p:nvSpPr>
+        <p:spPr>
+          <a:xfrm>
+            <a:off x="3259264" y="745128"/>
+            <a:ext cx="2819394" cy="317500"/>
+          </a:xfrm>
+          <a:prstGeom prst="rect">
+            <a:avLst/>
+          </a:prstGeom>
+        </p:spPr>
+        <p:style>
+          <a:lnRef idx="2">
+            <a:schemeClr val="accent3">
+              <a:shade val="50000"/>
+            </a:schemeClr>
+          </a:lnRef>
+          <a:fillRef idx="1">
+            <a:schemeClr val="accent3"/>
+          </a:fillRef>
+          <a:effectRef idx="0">
+            <a:schemeClr val="accent3"/>
+          </a:effectRef>
+          <a:fontRef idx="minor">
+            <a:schemeClr val="lt1"/>
+          </a:fontRef>
+        </p:style>
+        <p:txBody>
+          <a:bodyPr rtlCol="0" anchor="ctr"/>
+          <a:lstStyle/>
+          <a:p>
+            <a:pPr algn="ctr"/>
+            <a:r>
+              <a:rPr lang="en-US" altLang="ja-JP" sz="1000" dirty="0" err="1" smtClean="0"/>
+              <a:t>ServerSsl</a:t>
+            </a:r>
+            <a:endParaRPr kumimoji="1" lang="ja-JP" altLang="en-US" sz="1000" dirty="0"/>
+          </a:p>
+        </p:txBody>
+      </p:sp>
+      <p:sp>
+        <p:nvSpPr>
+          <p:cNvPr id="20" name="正方形/長方形 19"/>
+          <p:cNvSpPr/>
+          <p:nvPr/>
+        </p:nvSpPr>
+        <p:spPr>
+          <a:xfrm>
+            <a:off x="3259262" y="1999475"/>
+            <a:ext cx="1324429" cy="317500"/>
+          </a:xfrm>
+          <a:prstGeom prst="rect">
+            <a:avLst/>
+          </a:prstGeom>
+        </p:spPr>
+        <p:style>
+          <a:lnRef idx="2">
+            <a:schemeClr val="accent5">
+              <a:shade val="50000"/>
+            </a:schemeClr>
+          </a:lnRef>
+          <a:fillRef idx="1">
+            <a:schemeClr val="accent5"/>
+          </a:fillRef>
+          <a:effectRef idx="0">
+            <a:schemeClr val="accent5"/>
+          </a:effectRef>
+          <a:fontRef idx="minor">
+            <a:schemeClr val="lt1"/>
+          </a:fontRef>
+        </p:style>
+        <p:txBody>
+          <a:bodyPr rtlCol="0" anchor="ctr"/>
+          <a:lstStyle/>
+          <a:p>
+            <a:pPr algn="ctr"/>
+            <a:r>
+              <a:rPr lang="en-US" altLang="ja-JP" sz="1000" dirty="0" smtClean="0"/>
+              <a:t>Request2Env</a:t>
+            </a:r>
+            <a:endParaRPr kumimoji="1" lang="ja-JP" altLang="en-US" sz="1000" dirty="0"/>
+          </a:p>
+        </p:txBody>
+      </p:sp>
+      <p:sp>
+        <p:nvSpPr>
+          <p:cNvPr id="22" name="正方形/長方形 21"/>
+          <p:cNvSpPr/>
+          <p:nvPr/>
+        </p:nvSpPr>
+        <p:spPr>
+          <a:xfrm>
+            <a:off x="3275586" y="4542045"/>
+            <a:ext cx="1324429" cy="317500"/>
+          </a:xfrm>
+          <a:prstGeom prst="rect">
+            <a:avLst/>
+          </a:prstGeom>
+        </p:spPr>
+        <p:style>
+          <a:lnRef idx="1">
+            <a:schemeClr val="accent1"/>
+          </a:lnRef>
+          <a:fillRef idx="3">
+            <a:schemeClr val="accent1"/>
+          </a:fillRef>
+          <a:effectRef idx="2">
+            <a:schemeClr val="accent1"/>
+          </a:effectRef>
+          <a:fontRef idx="minor">
+            <a:schemeClr val="lt1"/>
+          </a:fontRef>
+        </p:style>
+        <p:txBody>
+          <a:bodyPr rtlCol="0" anchor="ctr"/>
+          <a:lstStyle/>
+          <a:p>
+            <a:pPr algn="ctr"/>
+            <a:r>
+              <a:rPr lang="en-US" altLang="ja-JP" sz="1000" dirty="0" err="1" smtClean="0"/>
+              <a:t>UriParser</a:t>
+            </a:r>
+            <a:endParaRPr kumimoji="1" lang="ja-JP" altLang="en-US" sz="1000" dirty="0"/>
+          </a:p>
+        </p:txBody>
+      </p:sp>
+      <p:sp>
+        <p:nvSpPr>
+          <p:cNvPr id="25" name="正方形/長方形 24"/>
+          <p:cNvSpPr/>
+          <p:nvPr/>
+        </p:nvSpPr>
+        <p:spPr>
+          <a:xfrm>
+            <a:off x="3259262" y="4941316"/>
+            <a:ext cx="1324429" cy="317500"/>
+          </a:xfrm>
+          <a:prstGeom prst="rect">
+            <a:avLst/>
+          </a:prstGeom>
+        </p:spPr>
+        <p:style>
+          <a:lnRef idx="1">
+            <a:schemeClr val="accent1"/>
+          </a:lnRef>
+          <a:fillRef idx="3">
+            <a:schemeClr val="accent1"/>
+          </a:fillRef>
+          <a:effectRef idx="2">
+            <a:schemeClr val="accent1"/>
+          </a:effectRef>
+          <a:fontRef idx="minor">
+            <a:schemeClr val="lt1"/>
+          </a:fontRef>
+        </p:style>
+        <p:txBody>
+          <a:bodyPr rtlCol="0" anchor="ctr"/>
+          <a:lstStyle/>
+          <a:p>
+            <a:pPr algn="ctr"/>
+            <a:r>
+              <a:rPr lang="en-US" altLang="ja-JP" sz="1000" dirty="0" err="1" smtClean="0"/>
+              <a:t>MethodOverrider</a:t>
+            </a:r>
+            <a:endParaRPr kumimoji="1" lang="ja-JP" altLang="en-US" sz="1000" dirty="0"/>
+          </a:p>
+        </p:txBody>
+      </p:sp>
+      <p:sp>
+        <p:nvSpPr>
+          <p:cNvPr id="26" name="正方形/長方形 25"/>
+          <p:cNvSpPr/>
+          <p:nvPr/>
+        </p:nvSpPr>
+        <p:spPr>
+          <a:xfrm>
+            <a:off x="4770552" y="4113368"/>
+            <a:ext cx="1324429" cy="317500"/>
+          </a:xfrm>
+          <a:prstGeom prst="rect">
+            <a:avLst/>
+          </a:prstGeom>
+        </p:spPr>
+        <p:style>
+          <a:lnRef idx="1">
+            <a:schemeClr val="accent1"/>
+          </a:lnRef>
+          <a:fillRef idx="3">
+            <a:schemeClr val="accent1"/>
+          </a:fillRef>
+          <a:effectRef idx="2">
+            <a:schemeClr val="accent1"/>
+          </a:effectRef>
+          <a:fontRef idx="minor">
+            <a:schemeClr val="lt1"/>
+          </a:fontRef>
+        </p:style>
+        <p:txBody>
+          <a:bodyPr rtlCol="0" anchor="ctr"/>
+          <a:lstStyle/>
+          <a:p>
+            <a:pPr algn="ctr"/>
+            <a:r>
+              <a:rPr lang="en-US" altLang="ja-JP" sz="1000" dirty="0" err="1" smtClean="0"/>
+              <a:t>XSendResource</a:t>
+            </a:r>
+            <a:endParaRPr kumimoji="1" lang="ja-JP" altLang="en-US" sz="1000" dirty="0"/>
+          </a:p>
+        </p:txBody>
+      </p:sp>
+      <p:sp>
+        <p:nvSpPr>
+          <p:cNvPr id="27" name="正方形/長方形 26"/>
+          <p:cNvSpPr/>
+          <p:nvPr/>
+        </p:nvSpPr>
+        <p:spPr>
+          <a:xfrm>
+            <a:off x="4754229" y="1998311"/>
+            <a:ext cx="1324429" cy="317500"/>
+          </a:xfrm>
+          <a:prstGeom prst="rect">
+            <a:avLst/>
+          </a:prstGeom>
+        </p:spPr>
+        <p:style>
+          <a:lnRef idx="2">
+            <a:schemeClr val="accent5">
+              <a:shade val="50000"/>
+            </a:schemeClr>
+          </a:lnRef>
+          <a:fillRef idx="1">
+            <a:schemeClr val="accent5"/>
+          </a:fillRef>
+          <a:effectRef idx="0">
+            <a:schemeClr val="accent5"/>
+          </a:effectRef>
+          <a:fontRef idx="minor">
+            <a:schemeClr val="lt1"/>
+          </a:fontRef>
+        </p:style>
+        <p:txBody>
+          <a:bodyPr rtlCol="0" anchor="ctr"/>
+          <a:lstStyle/>
+          <a:p>
+            <a:pPr algn="ctr"/>
+            <a:r>
+              <a:rPr lang="en-US" altLang="ja-JP" sz="1000" dirty="0" smtClean="0"/>
+              <a:t>Env2Response</a:t>
+            </a:r>
+            <a:endParaRPr kumimoji="1" lang="ja-JP" altLang="en-US" sz="1000" dirty="0"/>
+          </a:p>
+        </p:txBody>
+      </p:sp>
+      <p:sp>
+        <p:nvSpPr>
+          <p:cNvPr id="28" name="正方形/長方形 27"/>
+          <p:cNvSpPr/>
+          <p:nvPr/>
+        </p:nvSpPr>
+        <p:spPr>
+          <a:xfrm>
+            <a:off x="4754229" y="4575256"/>
+            <a:ext cx="1324429" cy="317500"/>
+          </a:xfrm>
+          <a:prstGeom prst="rect">
+            <a:avLst/>
+          </a:prstGeom>
+        </p:spPr>
+        <p:style>
+          <a:lnRef idx="1">
+            <a:schemeClr val="accent1"/>
+          </a:lnRef>
+          <a:fillRef idx="3">
+            <a:schemeClr val="accent1"/>
+          </a:fillRef>
+          <a:effectRef idx="2">
+            <a:schemeClr val="accent1"/>
+          </a:effectRef>
+          <a:fontRef idx="minor">
+            <a:schemeClr val="lt1"/>
+          </a:fontRef>
+        </p:style>
+        <p:txBody>
+          <a:bodyPr rtlCol="0" anchor="ctr"/>
+          <a:lstStyle/>
+          <a:p>
+            <a:pPr algn="ctr"/>
+            <a:r>
+              <a:rPr lang="en-US" altLang="ja-JP" sz="1000" dirty="0" err="1"/>
+              <a:t>R</a:t>
+            </a:r>
+            <a:r>
+              <a:rPr lang="en-US" altLang="ja-JP" sz="1000" dirty="0" err="1" smtClean="0"/>
+              <a:t>esponseCacher</a:t>
+            </a:r>
+            <a:endParaRPr kumimoji="1" lang="ja-JP" altLang="en-US" sz="1000" dirty="0"/>
+          </a:p>
+        </p:txBody>
+      </p:sp>
+      <p:sp>
+        <p:nvSpPr>
+          <p:cNvPr id="34" name="テキスト ボックス 33"/>
+          <p:cNvSpPr txBox="1"/>
+          <p:nvPr/>
+        </p:nvSpPr>
+        <p:spPr>
+          <a:xfrm>
+            <a:off x="3259262" y="177346"/>
+            <a:ext cx="1324429" cy="523220"/>
+          </a:xfrm>
+          <a:prstGeom prst="rect">
+            <a:avLst/>
+          </a:prstGeom>
+          <a:noFill/>
+        </p:spPr>
+        <p:txBody>
+          <a:bodyPr wrap="square" rtlCol="0">
+            <a:spAutoFit/>
+          </a:bodyPr>
+          <a:lstStyle/>
+          <a:p>
+            <a:pPr algn="ctr"/>
+            <a:r>
+              <a:rPr kumimoji="1" lang="en-US" altLang="ja-JP" sz="1400" dirty="0" smtClean="0"/>
+              <a:t>Request</a:t>
+            </a:r>
+          </a:p>
+          <a:p>
+            <a:pPr algn="ctr"/>
+            <a:r>
+              <a:rPr lang="en-US" altLang="ja-JP" sz="1400" dirty="0" smtClean="0"/>
+              <a:t>(Inbound)</a:t>
+            </a:r>
+            <a:endParaRPr kumimoji="1" lang="ja-JP" altLang="en-US" sz="1400" dirty="0"/>
+          </a:p>
+        </p:txBody>
+      </p:sp>
+      <p:sp>
+        <p:nvSpPr>
+          <p:cNvPr id="35" name="テキスト ボックス 34"/>
+          <p:cNvSpPr txBox="1"/>
+          <p:nvPr/>
+        </p:nvSpPr>
+        <p:spPr>
+          <a:xfrm>
+            <a:off x="4754229" y="177346"/>
+            <a:ext cx="1324429" cy="523220"/>
+          </a:xfrm>
+          <a:prstGeom prst="rect">
+            <a:avLst/>
+          </a:prstGeom>
+          <a:noFill/>
+        </p:spPr>
+        <p:txBody>
+          <a:bodyPr wrap="square" rtlCol="0">
+            <a:spAutoFit/>
+          </a:bodyPr>
+          <a:lstStyle/>
+          <a:p>
+            <a:pPr algn="ctr"/>
+            <a:r>
+              <a:rPr kumimoji="1" lang="en-US" altLang="ja-JP" sz="1400" dirty="0" smtClean="0"/>
+              <a:t>Response</a:t>
+            </a:r>
+          </a:p>
+          <a:p>
+            <a:pPr algn="ctr"/>
+            <a:r>
+              <a:rPr lang="en-US" altLang="ja-JP" sz="1400" dirty="0" smtClean="0"/>
+              <a:t>(Outbound)</a:t>
+            </a:r>
+            <a:endParaRPr kumimoji="1" lang="ja-JP" altLang="en-US" sz="1400" dirty="0"/>
+          </a:p>
+        </p:txBody>
+      </p:sp>
+      <p:sp>
+        <p:nvSpPr>
+          <p:cNvPr id="46" name="角丸四角形吹き出し 45"/>
+          <p:cNvSpPr/>
+          <p:nvPr/>
+        </p:nvSpPr>
+        <p:spPr>
+          <a:xfrm>
+            <a:off x="639807" y="5148045"/>
+            <a:ext cx="1746780" cy="646002"/>
           </a:xfrm>
           <a:prstGeom prst="wedgeRoundRectCallout">
             <a:avLst>
-              <a:gd name="adj1" fmla="val -100984"/>
-              <a:gd name="adj2" fmla="val 130634"/>
+              <a:gd name="adj1" fmla="val 95972"/>
+              <a:gd name="adj2" fmla="val -7959"/>
               <a:gd name="adj3" fmla="val 16667"/>
             </a:avLst>
           </a:prstGeom>
@@ -4971,13 +4333,788 @@
           <a:p>
             <a:r>
               <a:rPr lang="en-US" altLang="ja-JP" sz="1200" dirty="0" smtClean="0"/>
+              <a:t>Selects and calls action</a:t>
+            </a:r>
+          </a:p>
+          <a:p>
+            <a:r>
+              <a:rPr lang="en-US" altLang="ja-JP" sz="1200" dirty="0" smtClean="0"/>
+              <a:t>(see next slide)</a:t>
+            </a:r>
+            <a:endParaRPr lang="ja-JP" altLang="en-US" sz="1200" dirty="0"/>
+          </a:p>
+        </p:txBody>
+      </p:sp>
+      <p:sp>
+        <p:nvSpPr>
+          <p:cNvPr id="47" name="タイトル 1"/>
+          <p:cNvSpPr>
+            <a:spLocks noGrp="1"/>
+          </p:cNvSpPr>
+          <p:nvPr>
+            <p:ph type="title"/>
+          </p:nvPr>
+        </p:nvSpPr>
+        <p:spPr>
+          <a:xfrm>
+            <a:off x="6094981" y="5918730"/>
+            <a:ext cx="2866571" cy="809870"/>
+          </a:xfrm>
+        </p:spPr>
+        <p:txBody>
+          <a:bodyPr>
+            <a:noAutofit/>
+          </a:bodyPr>
+          <a:lstStyle/>
+          <a:p>
+            <a:r>
+              <a:rPr kumimoji="1" lang="en-US" altLang="ja-JP" sz="2400" dirty="0" smtClean="0"/>
+              <a:t>Handler architecture</a:t>
+            </a:r>
+            <a:br>
+              <a:rPr kumimoji="1" lang="en-US" altLang="ja-JP" sz="2400" dirty="0" smtClean="0"/>
+            </a:br>
+            <a:r>
+              <a:rPr lang="en-US" altLang="ja-JP" sz="2400" dirty="0" smtClean="0"/>
+              <a:t>based on </a:t>
+            </a:r>
+            <a:r>
+              <a:rPr lang="en-US" altLang="ja-JP" sz="2400" dirty="0" err="1" smtClean="0"/>
+              <a:t>Netty</a:t>
+            </a:r>
+            <a:r>
+              <a:rPr lang="en-US" altLang="ja-JP" sz="2400" dirty="0" smtClean="0"/>
+              <a:t> 4</a:t>
+            </a:r>
+            <a:endParaRPr kumimoji="1" lang="ja-JP" altLang="en-US" sz="2400" dirty="0"/>
+          </a:p>
+        </p:txBody>
+      </p:sp>
+      <p:sp>
+        <p:nvSpPr>
+          <p:cNvPr id="48" name="角丸四角形吹き出し 47"/>
+          <p:cNvSpPr/>
+          <p:nvPr/>
+        </p:nvSpPr>
+        <p:spPr>
+          <a:xfrm>
+            <a:off x="639807" y="1999475"/>
+            <a:ext cx="1746780" cy="1032150"/>
+          </a:xfrm>
+          <a:prstGeom prst="wedgeRoundRectCallout">
+            <a:avLst>
+              <a:gd name="adj1" fmla="val 97394"/>
+              <a:gd name="adj2" fmla="val -33729"/>
+              <a:gd name="adj3" fmla="val 16667"/>
+            </a:avLst>
+          </a:prstGeom>
+        </p:spPr>
+        <p:style>
+          <a:lnRef idx="1">
+            <a:schemeClr val="dk1"/>
+          </a:lnRef>
+          <a:fillRef idx="2">
+            <a:schemeClr val="dk1"/>
+          </a:fillRef>
+          <a:effectRef idx="1">
+            <a:schemeClr val="dk1"/>
+          </a:effectRef>
+          <a:fontRef idx="minor">
+            <a:schemeClr val="dk1"/>
+          </a:fontRef>
+        </p:style>
+        <p:txBody>
+          <a:bodyPr rtlCol="0" anchor="ctr"/>
+          <a:lstStyle/>
+          <a:p>
+            <a:r>
+              <a:rPr lang="en-US" altLang="ja-JP" sz="1200" dirty="0" smtClean="0"/>
+              <a:t>Aggregates </a:t>
+            </a:r>
+            <a:r>
+              <a:rPr lang="en-US" altLang="ja-JP" sz="1200" dirty="0" err="1" smtClean="0"/>
+              <a:t>HttpObjects</a:t>
+            </a:r>
+            <a:r>
+              <a:rPr lang="en-US" altLang="ja-JP" sz="1200" dirty="0" smtClean="0"/>
+              <a:t> (headers and contents) to make </a:t>
+            </a:r>
+            <a:r>
+              <a:rPr lang="en-US" altLang="ja-JP" sz="1200" dirty="0" err="1" smtClean="0"/>
+              <a:t>Xitrum</a:t>
+            </a:r>
+            <a:r>
+              <a:rPr lang="en-US" altLang="ja-JP" sz="1200" dirty="0" smtClean="0"/>
+              <a:t> </a:t>
+            </a:r>
+            <a:r>
+              <a:rPr lang="en-US" altLang="ja-JP" sz="1200" dirty="0" err="1" smtClean="0"/>
+              <a:t>HandlerEnv</a:t>
+            </a:r>
+            <a:endParaRPr lang="ja-JP" altLang="en-US" sz="1200" dirty="0"/>
+          </a:p>
+        </p:txBody>
+      </p:sp>
+      <p:sp>
+        <p:nvSpPr>
+          <p:cNvPr id="49" name="角丸四角形吹き出し 48"/>
+          <p:cNvSpPr/>
+          <p:nvPr/>
+        </p:nvSpPr>
+        <p:spPr>
+          <a:xfrm>
+            <a:off x="6657410" y="1998311"/>
+            <a:ext cx="1727228" cy="797549"/>
+          </a:xfrm>
+          <a:prstGeom prst="wedgeRoundRectCallout">
+            <a:avLst>
+              <a:gd name="adj1" fmla="val -80442"/>
+              <a:gd name="adj2" fmla="val -34771"/>
+              <a:gd name="adj3" fmla="val 16667"/>
+            </a:avLst>
+          </a:prstGeom>
+        </p:spPr>
+        <p:style>
+          <a:lnRef idx="1">
+            <a:schemeClr val="dk1"/>
+          </a:lnRef>
+          <a:fillRef idx="2">
+            <a:schemeClr val="dk1"/>
+          </a:fillRef>
+          <a:effectRef idx="1">
+            <a:schemeClr val="dk1"/>
+          </a:effectRef>
+          <a:fontRef idx="minor">
+            <a:schemeClr val="dk1"/>
+          </a:fontRef>
+        </p:style>
+        <p:txBody>
+          <a:bodyPr rtlCol="0" anchor="ctr"/>
+          <a:lstStyle/>
+          <a:p>
+            <a:r>
+              <a:rPr lang="en-US" altLang="ja-JP" sz="1200" dirty="0" smtClean="0"/>
+              <a:t>Converts </a:t>
+            </a:r>
+            <a:r>
+              <a:rPr lang="en-US" altLang="ja-JP" sz="1200" dirty="0" err="1" smtClean="0"/>
+              <a:t>Xitrum</a:t>
+            </a:r>
+            <a:r>
+              <a:rPr lang="en-US" altLang="ja-JP" sz="1200" dirty="0" smtClean="0"/>
+              <a:t> </a:t>
+            </a:r>
+            <a:r>
+              <a:rPr lang="en-US" altLang="ja-JP" sz="1200" dirty="0" err="1" smtClean="0"/>
+              <a:t>HandlerEnv</a:t>
+            </a:r>
+            <a:r>
+              <a:rPr lang="en-US" altLang="ja-JP" sz="1200" dirty="0" smtClean="0"/>
+              <a:t> to </a:t>
+            </a:r>
+            <a:r>
+              <a:rPr lang="en-US" altLang="ja-JP" sz="1200" dirty="0" err="1" smtClean="0"/>
+              <a:t>FullHttpResponse</a:t>
+            </a:r>
+            <a:endParaRPr lang="ja-JP" altLang="en-US" sz="1200" dirty="0"/>
+          </a:p>
+        </p:txBody>
+      </p:sp>
+      <p:sp>
+        <p:nvSpPr>
+          <p:cNvPr id="57" name="角丸四角形吹き出し 56"/>
+          <p:cNvSpPr/>
+          <p:nvPr/>
+        </p:nvSpPr>
+        <p:spPr>
+          <a:xfrm>
+            <a:off x="6657410" y="4217325"/>
+            <a:ext cx="1727228" cy="592435"/>
+          </a:xfrm>
+          <a:prstGeom prst="wedgeRoundRectCallout">
+            <a:avLst>
+              <a:gd name="adj1" fmla="val -132975"/>
+              <a:gd name="adj2" fmla="val 142089"/>
+              <a:gd name="adj3" fmla="val 16667"/>
+            </a:avLst>
+          </a:prstGeom>
+        </p:spPr>
+        <p:style>
+          <a:lnRef idx="1">
+            <a:schemeClr val="dk1"/>
+          </a:lnRef>
+          <a:fillRef idx="2">
+            <a:schemeClr val="dk1"/>
+          </a:fillRef>
+          <a:effectRef idx="1">
+            <a:schemeClr val="dk1"/>
+          </a:effectRef>
+          <a:fontRef idx="minor">
+            <a:schemeClr val="dk1"/>
+          </a:fontRef>
+        </p:style>
+        <p:txBody>
+          <a:bodyPr rtlCol="0" anchor="ctr"/>
+          <a:lstStyle/>
+          <a:p>
+            <a:r>
+              <a:rPr lang="en-US" altLang="ja-JP" sz="1200" dirty="0" smtClean="0"/>
               <a:t>Shortcut may happen</a:t>
             </a:r>
           </a:p>
           <a:p>
             <a:r>
               <a:rPr lang="en-US" altLang="ja-JP" sz="1200" dirty="0" smtClean="0"/>
-              <a:t>(controller/action is not called)</a:t>
+              <a:t>(action </a:t>
+            </a:r>
+            <a:r>
+              <a:rPr lang="en-US" altLang="ja-JP" sz="1200" dirty="0" smtClean="0"/>
+              <a:t>is not called)</a:t>
+            </a:r>
+            <a:endParaRPr lang="ja-JP" altLang="en-US" sz="1200" dirty="0"/>
+          </a:p>
+        </p:txBody>
+      </p:sp>
+      <p:sp>
+        <p:nvSpPr>
+          <p:cNvPr id="36" name="正方形/長方形 35"/>
+          <p:cNvSpPr/>
+          <p:nvPr/>
+        </p:nvSpPr>
+        <p:spPr>
+          <a:xfrm>
+            <a:off x="3259264" y="2389225"/>
+            <a:ext cx="1324429" cy="317500"/>
+          </a:xfrm>
+          <a:prstGeom prst="rect">
+            <a:avLst/>
+          </a:prstGeom>
+        </p:spPr>
+        <p:style>
+          <a:lnRef idx="1">
+            <a:schemeClr val="accent1"/>
+          </a:lnRef>
+          <a:fillRef idx="3">
+            <a:schemeClr val="accent1"/>
+          </a:fillRef>
+          <a:effectRef idx="2">
+            <a:schemeClr val="accent1"/>
+          </a:effectRef>
+          <a:fontRef idx="minor">
+            <a:schemeClr val="lt1"/>
+          </a:fontRef>
+        </p:style>
+        <p:txBody>
+          <a:bodyPr rtlCol="0" anchor="ctr"/>
+          <a:lstStyle/>
+          <a:p>
+            <a:pPr algn="ctr"/>
+            <a:r>
+              <a:rPr lang="en-US" altLang="ja-JP" sz="1000" dirty="0" err="1" smtClean="0"/>
+              <a:t>NoPipelining</a:t>
+            </a:r>
+            <a:endParaRPr kumimoji="1" lang="ja-JP" altLang="en-US" sz="1000" dirty="0"/>
+          </a:p>
+        </p:txBody>
+      </p:sp>
+      <p:sp>
+        <p:nvSpPr>
+          <p:cNvPr id="37" name="正方形/長方形 36"/>
+          <p:cNvSpPr/>
+          <p:nvPr/>
+        </p:nvSpPr>
+        <p:spPr>
+          <a:xfrm>
+            <a:off x="3259262" y="3234914"/>
+            <a:ext cx="1324429" cy="317500"/>
+          </a:xfrm>
+          <a:prstGeom prst="rect">
+            <a:avLst/>
+          </a:prstGeom>
+        </p:spPr>
+        <p:style>
+          <a:lnRef idx="1">
+            <a:schemeClr val="accent1"/>
+          </a:lnRef>
+          <a:fillRef idx="3">
+            <a:schemeClr val="accent1"/>
+          </a:fillRef>
+          <a:effectRef idx="2">
+            <a:schemeClr val="accent1"/>
+          </a:effectRef>
+          <a:fontRef idx="minor">
+            <a:schemeClr val="lt1"/>
+          </a:fontRef>
+        </p:style>
+        <p:txBody>
+          <a:bodyPr rtlCol="0" anchor="ctr"/>
+          <a:lstStyle/>
+          <a:p>
+            <a:pPr algn="ctr"/>
+            <a:r>
+              <a:rPr lang="en-US" altLang="ja-JP" sz="1000" dirty="0" err="1" smtClean="0"/>
+              <a:t>BasicAuth</a:t>
+            </a:r>
+            <a:endParaRPr kumimoji="1" lang="ja-JP" altLang="en-US" sz="1000" dirty="0"/>
+          </a:p>
+        </p:txBody>
+      </p:sp>
+      <p:sp>
+        <p:nvSpPr>
+          <p:cNvPr id="39" name="正方形/長方形 38"/>
+          <p:cNvSpPr/>
+          <p:nvPr/>
+        </p:nvSpPr>
+        <p:spPr>
+          <a:xfrm>
+            <a:off x="3275586" y="5833381"/>
+            <a:ext cx="1324429" cy="317500"/>
+          </a:xfrm>
+          <a:prstGeom prst="rect">
+            <a:avLst/>
+          </a:prstGeom>
+          <a:solidFill>
+            <a:schemeClr val="accent2">
+              <a:lumMod val="75000"/>
+            </a:schemeClr>
+          </a:solidFill>
+        </p:spPr>
+        <p:style>
+          <a:lnRef idx="1">
+            <a:schemeClr val="accent1"/>
+          </a:lnRef>
+          <a:fillRef idx="3">
+            <a:schemeClr val="accent1"/>
+          </a:fillRef>
+          <a:effectRef idx="2">
+            <a:schemeClr val="accent1"/>
+          </a:effectRef>
+          <a:fontRef idx="minor">
+            <a:schemeClr val="lt1"/>
+          </a:fontRef>
+        </p:style>
+        <p:txBody>
+          <a:bodyPr rtlCol="0" anchor="ctr"/>
+          <a:lstStyle/>
+          <a:p>
+            <a:pPr algn="ctr"/>
+            <a:r>
+              <a:rPr lang="en-US" altLang="ja-JP" sz="1000" dirty="0" err="1" smtClean="0"/>
+              <a:t>BadClientSilencer</a:t>
+            </a:r>
+            <a:endParaRPr kumimoji="1" lang="ja-JP" altLang="en-US" sz="1000" dirty="0"/>
+          </a:p>
+        </p:txBody>
+      </p:sp>
+      <p:sp>
+        <p:nvSpPr>
+          <p:cNvPr id="40" name="正方形/長方形 39"/>
+          <p:cNvSpPr/>
+          <p:nvPr/>
+        </p:nvSpPr>
+        <p:spPr>
+          <a:xfrm>
+            <a:off x="4754229" y="1568064"/>
+            <a:ext cx="1324429" cy="317500"/>
+          </a:xfrm>
+          <a:prstGeom prst="rect">
+            <a:avLst/>
+          </a:prstGeom>
+          <a:ln/>
+        </p:spPr>
+        <p:style>
+          <a:lnRef idx="2">
+            <a:schemeClr val="accent3">
+              <a:shade val="50000"/>
+            </a:schemeClr>
+          </a:lnRef>
+          <a:fillRef idx="1">
+            <a:schemeClr val="accent3"/>
+          </a:fillRef>
+          <a:effectRef idx="0">
+            <a:schemeClr val="accent3"/>
+          </a:effectRef>
+          <a:fontRef idx="minor">
+            <a:schemeClr val="lt1"/>
+          </a:fontRef>
+        </p:style>
+        <p:txBody>
+          <a:bodyPr rtlCol="0" anchor="ctr"/>
+          <a:lstStyle/>
+          <a:p>
+            <a:pPr algn="ctr"/>
+            <a:r>
+              <a:rPr lang="en-US" altLang="ja-JP" sz="1000" dirty="0" err="1" smtClean="0"/>
+              <a:t>ChunkedWrite</a:t>
+            </a:r>
+            <a:endParaRPr kumimoji="1" lang="ja-JP" altLang="en-US" sz="1000" dirty="0"/>
+          </a:p>
+        </p:txBody>
+      </p:sp>
+      <p:sp>
+        <p:nvSpPr>
+          <p:cNvPr id="42" name="正方形/長方形 41"/>
+          <p:cNvSpPr/>
+          <p:nvPr/>
+        </p:nvSpPr>
+        <p:spPr>
+          <a:xfrm>
+            <a:off x="4770552" y="2398053"/>
+            <a:ext cx="1324429" cy="317500"/>
+          </a:xfrm>
+          <a:prstGeom prst="rect">
+            <a:avLst/>
+          </a:prstGeom>
+        </p:spPr>
+        <p:style>
+          <a:lnRef idx="1">
+            <a:schemeClr val="accent1"/>
+          </a:lnRef>
+          <a:fillRef idx="3">
+            <a:schemeClr val="accent1"/>
+          </a:fillRef>
+          <a:effectRef idx="2">
+            <a:schemeClr val="accent1"/>
+          </a:effectRef>
+          <a:fontRef idx="minor">
+            <a:schemeClr val="lt1"/>
+          </a:fontRef>
+        </p:style>
+        <p:txBody>
+          <a:bodyPr rtlCol="0" anchor="ctr"/>
+          <a:lstStyle/>
+          <a:p>
+            <a:pPr algn="ctr"/>
+            <a:r>
+              <a:rPr lang="en-US" altLang="ja-JP" sz="1000" dirty="0" err="1" smtClean="0"/>
+              <a:t>SetCORS</a:t>
+            </a:r>
+            <a:endParaRPr kumimoji="1" lang="ja-JP" altLang="en-US" sz="1000" dirty="0"/>
+          </a:p>
+        </p:txBody>
+      </p:sp>
+      <p:sp>
+        <p:nvSpPr>
+          <p:cNvPr id="43" name="正方形/長方形 42"/>
+          <p:cNvSpPr/>
+          <p:nvPr/>
+        </p:nvSpPr>
+        <p:spPr>
+          <a:xfrm>
+            <a:off x="4754229" y="2795860"/>
+            <a:ext cx="1324429" cy="317500"/>
+          </a:xfrm>
+          <a:prstGeom prst="rect">
+            <a:avLst/>
+          </a:prstGeom>
+        </p:spPr>
+        <p:style>
+          <a:lnRef idx="1">
+            <a:schemeClr val="accent1"/>
+          </a:lnRef>
+          <a:fillRef idx="3">
+            <a:schemeClr val="accent1"/>
+          </a:fillRef>
+          <a:effectRef idx="2">
+            <a:schemeClr val="accent1"/>
+          </a:effectRef>
+          <a:fontRef idx="minor">
+            <a:schemeClr val="lt1"/>
+          </a:fontRef>
+        </p:style>
+        <p:txBody>
+          <a:bodyPr rtlCol="0" anchor="ctr"/>
+          <a:lstStyle/>
+          <a:p>
+            <a:pPr algn="ctr"/>
+            <a:r>
+              <a:rPr lang="en-US" altLang="ja-JP" sz="1000" dirty="0" err="1" smtClean="0"/>
+              <a:t>OPTIONSResponse</a:t>
+            </a:r>
+            <a:endParaRPr kumimoji="1" lang="ja-JP" altLang="en-US" sz="1000" dirty="0"/>
+          </a:p>
+        </p:txBody>
+      </p:sp>
+      <p:sp>
+        <p:nvSpPr>
+          <p:cNvPr id="45" name="正方形/長方形 44"/>
+          <p:cNvSpPr/>
+          <p:nvPr/>
+        </p:nvSpPr>
+        <p:spPr>
+          <a:xfrm>
+            <a:off x="4770552" y="3234914"/>
+            <a:ext cx="1324429" cy="317500"/>
+          </a:xfrm>
+          <a:prstGeom prst="rect">
+            <a:avLst/>
+          </a:prstGeom>
+        </p:spPr>
+        <p:style>
+          <a:lnRef idx="1">
+            <a:schemeClr val="accent1"/>
+          </a:lnRef>
+          <a:fillRef idx="3">
+            <a:schemeClr val="accent1"/>
+          </a:fillRef>
+          <a:effectRef idx="2">
+            <a:schemeClr val="accent1"/>
+          </a:effectRef>
+          <a:fontRef idx="minor">
+            <a:schemeClr val="lt1"/>
+          </a:fontRef>
+        </p:style>
+        <p:txBody>
+          <a:bodyPr rtlCol="0" anchor="ctr"/>
+          <a:lstStyle/>
+          <a:p>
+            <a:pPr algn="ctr"/>
+            <a:r>
+              <a:rPr lang="en-US" altLang="ja-JP" sz="1000" dirty="0" smtClean="0"/>
+              <a:t>FixiOS6SafariPOST</a:t>
+            </a:r>
+            <a:endParaRPr kumimoji="1" lang="ja-JP" altLang="en-US" sz="1000" dirty="0"/>
+          </a:p>
+        </p:txBody>
+      </p:sp>
+      <p:sp>
+        <p:nvSpPr>
+          <p:cNvPr id="51" name="角丸四角形吹き出し 50"/>
+          <p:cNvSpPr/>
+          <p:nvPr/>
+        </p:nvSpPr>
+        <p:spPr>
+          <a:xfrm>
+            <a:off x="639807" y="6105675"/>
+            <a:ext cx="1746780" cy="432558"/>
+          </a:xfrm>
+          <a:prstGeom prst="wedgeRoundRectCallout">
+            <a:avLst>
+              <a:gd name="adj1" fmla="val 93752"/>
+              <a:gd name="adj2" fmla="val -64111"/>
+              <a:gd name="adj3" fmla="val 16667"/>
+            </a:avLst>
+          </a:prstGeom>
+        </p:spPr>
+        <p:style>
+          <a:lnRef idx="1">
+            <a:schemeClr val="dk1"/>
+          </a:lnRef>
+          <a:fillRef idx="2">
+            <a:schemeClr val="dk1"/>
+          </a:fillRef>
+          <a:effectRef idx="1">
+            <a:schemeClr val="dk1"/>
+          </a:effectRef>
+          <a:fontRef idx="minor">
+            <a:schemeClr val="dk1"/>
+          </a:fontRef>
+        </p:style>
+        <p:txBody>
+          <a:bodyPr rtlCol="0" anchor="ctr"/>
+          <a:lstStyle/>
+          <a:p>
+            <a:r>
+              <a:rPr lang="en-US" altLang="ja-JP" sz="1200" dirty="0" smtClean="0"/>
+              <a:t>Catches all errors</a:t>
+            </a:r>
+            <a:endParaRPr lang="ja-JP" altLang="en-US" sz="1200" dirty="0"/>
+          </a:p>
+        </p:txBody>
+      </p:sp>
+      <p:sp>
+        <p:nvSpPr>
+          <p:cNvPr id="52" name="角丸四角形吹き出し 51"/>
+          <p:cNvSpPr/>
+          <p:nvPr/>
+        </p:nvSpPr>
+        <p:spPr>
+          <a:xfrm>
+            <a:off x="639807" y="3234914"/>
+            <a:ext cx="1746780" cy="535231"/>
+          </a:xfrm>
+          <a:prstGeom prst="wedgeRoundRectCallout">
+            <a:avLst>
+              <a:gd name="adj1" fmla="val 97637"/>
+              <a:gd name="adj2" fmla="val 60873"/>
+              <a:gd name="adj3" fmla="val 16667"/>
+            </a:avLst>
+          </a:prstGeom>
+        </p:spPr>
+        <p:style>
+          <a:lnRef idx="1">
+            <a:schemeClr val="dk1"/>
+          </a:lnRef>
+          <a:fillRef idx="2">
+            <a:schemeClr val="dk1"/>
+          </a:fillRef>
+          <a:effectRef idx="1">
+            <a:schemeClr val="dk1"/>
+          </a:effectRef>
+          <a:fontRef idx="minor">
+            <a:schemeClr val="dk1"/>
+          </a:fontRef>
+        </p:style>
+        <p:txBody>
+          <a:bodyPr rtlCol="0" anchor="ctr"/>
+          <a:lstStyle/>
+          <a:p>
+            <a:r>
+              <a:rPr lang="en-US" altLang="ja-JP" sz="1200" dirty="0" smtClean="0"/>
+              <a:t>Serves static files in public directory</a:t>
+            </a:r>
+            <a:endParaRPr lang="ja-JP" altLang="en-US" sz="1200" dirty="0"/>
+          </a:p>
+        </p:txBody>
+      </p:sp>
+      <p:sp>
+        <p:nvSpPr>
+          <p:cNvPr id="53" name="角丸四角形吹き出し 52"/>
+          <p:cNvSpPr/>
+          <p:nvPr/>
+        </p:nvSpPr>
+        <p:spPr>
+          <a:xfrm>
+            <a:off x="639807" y="4274429"/>
+            <a:ext cx="1746780" cy="535231"/>
+          </a:xfrm>
+          <a:prstGeom prst="wedgeRoundRectCallout">
+            <a:avLst>
+              <a:gd name="adj1" fmla="val 99302"/>
+              <a:gd name="adj2" fmla="val -45998"/>
+              <a:gd name="adj3" fmla="val 16667"/>
+            </a:avLst>
+          </a:prstGeom>
+        </p:spPr>
+        <p:style>
+          <a:lnRef idx="1">
+            <a:schemeClr val="dk1"/>
+          </a:lnRef>
+          <a:fillRef idx="2">
+            <a:schemeClr val="dk1"/>
+          </a:fillRef>
+          <a:effectRef idx="1">
+            <a:schemeClr val="dk1"/>
+          </a:effectRef>
+          <a:fontRef idx="minor">
+            <a:schemeClr val="dk1"/>
+          </a:fontRef>
+        </p:style>
+        <p:txBody>
+          <a:bodyPr rtlCol="0" anchor="ctr"/>
+          <a:lstStyle/>
+          <a:p>
+            <a:r>
+              <a:rPr lang="en-US" altLang="ja-JP" sz="1200" dirty="0" smtClean="0"/>
+              <a:t>Serves resource files in </a:t>
+            </a:r>
+            <a:r>
+              <a:rPr lang="en-US" altLang="ja-JP" sz="1200" dirty="0" err="1" smtClean="0"/>
+              <a:t>classpath</a:t>
+            </a:r>
+            <a:r>
+              <a:rPr lang="en-US" altLang="ja-JP" sz="1200" dirty="0"/>
+              <a:t> </a:t>
+            </a:r>
+            <a:r>
+              <a:rPr lang="en-US" altLang="ja-JP" sz="1200" dirty="0" smtClean="0"/>
+              <a:t>(and JAR files)</a:t>
+            </a:r>
+            <a:endParaRPr lang="ja-JP" altLang="en-US" sz="1200" dirty="0"/>
+          </a:p>
+        </p:txBody>
+      </p:sp>
+      <p:sp>
+        <p:nvSpPr>
+          <p:cNvPr id="56" name="角丸四角形吹き出し 55"/>
+          <p:cNvSpPr/>
+          <p:nvPr/>
+        </p:nvSpPr>
+        <p:spPr>
+          <a:xfrm>
+            <a:off x="639807" y="862855"/>
+            <a:ext cx="1746780" cy="695644"/>
+          </a:xfrm>
+          <a:prstGeom prst="wedgeRoundRectCallout">
+            <a:avLst>
+              <a:gd name="adj1" fmla="val 97637"/>
+              <a:gd name="adj2" fmla="val 8343"/>
+              <a:gd name="adj3" fmla="val 16667"/>
+            </a:avLst>
+          </a:prstGeom>
+        </p:spPr>
+        <p:style>
+          <a:lnRef idx="1">
+            <a:schemeClr val="dk1"/>
+          </a:lnRef>
+          <a:fillRef idx="2">
+            <a:schemeClr val="dk1"/>
+          </a:fillRef>
+          <a:effectRef idx="1">
+            <a:schemeClr val="dk1"/>
+          </a:effectRef>
+          <a:fontRef idx="minor">
+            <a:schemeClr val="dk1"/>
+          </a:fontRef>
+        </p:style>
+        <p:txBody>
+          <a:bodyPr rtlCol="0" anchor="ctr"/>
+          <a:lstStyle/>
+          <a:p>
+            <a:r>
+              <a:rPr lang="en-US" altLang="ja-JP" sz="1200" dirty="0" smtClean="0"/>
+              <a:t>Adobe Flash policy file can be served on the same port with HTTP</a:t>
+            </a:r>
+            <a:endParaRPr lang="ja-JP" altLang="en-US" sz="1200" dirty="0"/>
+          </a:p>
+        </p:txBody>
+      </p:sp>
+      <p:sp>
+        <p:nvSpPr>
+          <p:cNvPr id="58" name="角丸四角形吹き出し 57"/>
+          <p:cNvSpPr/>
+          <p:nvPr/>
+        </p:nvSpPr>
+        <p:spPr>
+          <a:xfrm>
+            <a:off x="6657410" y="795012"/>
+            <a:ext cx="1727228" cy="535231"/>
+          </a:xfrm>
+          <a:prstGeom prst="wedgeRoundRectCallout">
+            <a:avLst>
+              <a:gd name="adj1" fmla="val -80010"/>
+              <a:gd name="adj2" fmla="val 33702"/>
+              <a:gd name="adj3" fmla="val 16667"/>
+            </a:avLst>
+          </a:prstGeom>
+        </p:spPr>
+        <p:style>
+          <a:lnRef idx="2">
+            <a:schemeClr val="accent3">
+              <a:shade val="50000"/>
+            </a:schemeClr>
+          </a:lnRef>
+          <a:fillRef idx="1">
+            <a:schemeClr val="accent3"/>
+          </a:fillRef>
+          <a:effectRef idx="0">
+            <a:schemeClr val="accent3"/>
+          </a:effectRef>
+          <a:fontRef idx="minor">
+            <a:schemeClr val="lt1"/>
+          </a:fontRef>
+        </p:style>
+        <p:txBody>
+          <a:bodyPr rtlCol="0" anchor="ctr"/>
+          <a:lstStyle/>
+          <a:p>
+            <a:r>
+              <a:rPr lang="en-US" altLang="ja-JP" sz="1200" dirty="0" smtClean="0"/>
+              <a:t>These 4 handlers are provided by </a:t>
+            </a:r>
+            <a:r>
+              <a:rPr lang="en-US" altLang="ja-JP" sz="1200" dirty="0" err="1" smtClean="0"/>
+              <a:t>Netty</a:t>
             </a:r>
             <a:endParaRPr lang="ja-JP" altLang="en-US" sz="1200" dirty="0"/>
           </a:p>
@@ -5038,6 +5175,57 @@
             <a:r>
               <a:rPr kumimoji="1" lang="en-US" altLang="ja-JP" dirty="0" smtClean="0"/>
               <a:t>Routing</a:t>
+            </a:r>
+            <a:endParaRPr kumimoji="1" lang="ja-JP" altLang="en-US" dirty="0"/>
+          </a:p>
+        </p:txBody>
+      </p:sp>
+      <p:sp>
+        <p:nvSpPr>
+          <p:cNvPr id="4" name="コンテンツ プレースホルダー 3"/>
+          <p:cNvSpPr>
+            <a:spLocks noGrp="1"/>
+          </p:cNvSpPr>
+          <p:nvPr>
+            <p:ph idx="1"/>
+          </p:nvPr>
+        </p:nvSpPr>
+        <p:spPr/>
+        <p:txBody>
+          <a:bodyPr/>
+          <a:lstStyle/>
+          <a:p>
+            <a:r>
+              <a:rPr kumimoji="1" lang="en-US" altLang="ja-JP" dirty="0" smtClean="0"/>
+              <a:t>Route collection:</a:t>
+            </a:r>
+            <a:br>
+              <a:rPr kumimoji="1" lang="en-US" altLang="ja-JP" dirty="0" smtClean="0"/>
+            </a:br>
+            <a:r>
+              <a:rPr kumimoji="1" lang="en-US" altLang="ja-JP" dirty="0" smtClean="0"/>
+              <a:t>At startup, </a:t>
+            </a:r>
+            <a:r>
+              <a:rPr kumimoji="1" lang="en-US" altLang="ja-JP" dirty="0" err="1" smtClean="0"/>
+              <a:t>Xitrum</a:t>
+            </a:r>
+            <a:r>
+              <a:rPr kumimoji="1" lang="en-US" altLang="ja-JP" dirty="0" smtClean="0"/>
+              <a:t> automatically collects all routes specified by annotations @GET(“hello”), @POST(“hi”) etc.</a:t>
+            </a:r>
+          </a:p>
+          <a:p>
+            <a:r>
+              <a:rPr lang="en-US" altLang="ja-JP" dirty="0" smtClean="0"/>
+              <a:t>Routing:</a:t>
+            </a:r>
+            <a:br>
+              <a:rPr lang="en-US" altLang="ja-JP" dirty="0" smtClean="0"/>
+            </a:br>
+            <a:r>
+              <a:rPr lang="en-US" altLang="ja-JP" dirty="0" smtClean="0"/>
+              <a:t>At “Dispatcher” (see previous slide), the an instance of the specified action class is created and its “execute” method is called.</a:t>
             </a:r>
             <a:endParaRPr kumimoji="1" lang="ja-JP" altLang="en-US" dirty="0"/>
           </a:p>

</xml_diff>

<commit_message>
Xitrum Internals: Leave out flash for brevity
</commit_message>
<xml_diff>
--- a/presentation/xitrum_internals.pptx
+++ b/presentation/xitrum_internals.pptx
@@ -3467,6 +3467,129 @@
       </p:grpSpPr>
       <p:cxnSp>
         <p:nvCxnSpPr>
+          <p:cNvPr id="68" name="直線矢印コネクタ 67"/>
+          <p:cNvCxnSpPr>
+            <a:stCxn id="12" idx="2"/>
+          </p:cNvCxnSpPr>
+          <p:nvPr/>
+        </p:nvCxnSpPr>
+        <p:spPr>
+          <a:xfrm>
+            <a:off x="3580918" y="4332889"/>
+            <a:ext cx="2368074" cy="1267843"/>
+          </a:xfrm>
+          <a:prstGeom prst="straightConnector1">
+            <a:avLst/>
+          </a:prstGeom>
+          <a:ln>
+            <a:prstDash val="dash"/>
+            <a:tailEnd type="arrow"/>
+          </a:ln>
+        </p:spPr>
+        <p:style>
+          <a:lnRef idx="1">
+            <a:schemeClr val="dk1"/>
+          </a:lnRef>
+          <a:fillRef idx="0">
+            <a:schemeClr val="dk1"/>
+          </a:fillRef>
+          <a:effectRef idx="0">
+            <a:schemeClr val="dk1"/>
+          </a:effectRef>
+          <a:fontRef idx="minor">
+            <a:schemeClr val="tx1"/>
+          </a:fontRef>
+        </p:style>
+      </p:cxnSp>
+      <p:cxnSp>
+        <p:nvCxnSpPr>
+          <p:cNvPr id="73" name="直線矢印コネクタ 72"/>
+          <p:cNvCxnSpPr>
+            <a:stCxn id="37" idx="2"/>
+          </p:cNvCxnSpPr>
+          <p:nvPr/>
+        </p:nvCxnSpPr>
+        <p:spPr>
+          <a:xfrm>
+            <a:off x="3587546" y="3454435"/>
+            <a:ext cx="2361446" cy="1906900"/>
+          </a:xfrm>
+          <a:prstGeom prst="straightConnector1">
+            <a:avLst/>
+          </a:prstGeom>
+          <a:ln>
+            <a:prstDash val="dash"/>
+            <a:tailEnd type="arrow"/>
+          </a:ln>
+        </p:spPr>
+        <p:style>
+          <a:lnRef idx="1">
+            <a:schemeClr val="dk1"/>
+          </a:lnRef>
+          <a:fillRef idx="0">
+            <a:schemeClr val="dk1"/>
+          </a:fillRef>
+          <a:effectRef idx="0">
+            <a:schemeClr val="dk1"/>
+          </a:effectRef>
+          <a:fontRef idx="minor">
+            <a:schemeClr val="tx1"/>
+          </a:fontRef>
+        </p:style>
+      </p:cxnSp>
+      <p:sp>
+        <p:nvSpPr>
+          <p:cNvPr id="57" name="角丸四角形吹き出し 56"/>
+          <p:cNvSpPr/>
+          <p:nvPr/>
+        </p:nvSpPr>
+        <p:spPr>
+          <a:xfrm>
+            <a:off x="7200274" y="4236924"/>
+            <a:ext cx="1727228" cy="592435"/>
+          </a:xfrm>
+          <a:prstGeom prst="wedgeRoundRectCallout">
+            <a:avLst>
+              <a:gd name="adj1" fmla="val -184610"/>
+              <a:gd name="adj2" fmla="val -16647"/>
+              <a:gd name="adj3" fmla="val 16667"/>
+            </a:avLst>
+          </a:prstGeom>
+        </p:spPr>
+        <p:style>
+          <a:lnRef idx="1">
+            <a:schemeClr val="dk1"/>
+          </a:lnRef>
+          <a:fillRef idx="2">
+            <a:schemeClr val="dk1"/>
+          </a:fillRef>
+          <a:effectRef idx="1">
+            <a:schemeClr val="dk1"/>
+          </a:effectRef>
+          <a:fontRef idx="minor">
+            <a:schemeClr val="dk1"/>
+          </a:fontRef>
+        </p:style>
+        <p:txBody>
+          <a:bodyPr rtlCol="0" anchor="ctr"/>
+          <a:lstStyle/>
+          <a:p>
+            <a:r>
+              <a:rPr lang="en-US" altLang="ja-JP" sz="1200" dirty="0" smtClean="0"/>
+              <a:t>Shortcut may happen</a:t>
+            </a:r>
+          </a:p>
+          <a:p>
+            <a:r>
+              <a:rPr lang="en-US" altLang="ja-JP" sz="1200" dirty="0" smtClean="0"/>
+              <a:t>(action will not be called at Dispatcher)</a:t>
+            </a:r>
+            <a:endParaRPr lang="ja-JP" altLang="en-US" sz="1200" dirty="0"/>
+          </a:p>
+        </p:txBody>
+      </p:sp>
+      <p:cxnSp>
+        <p:nvCxnSpPr>
           <p:cNvPr id="54" name="直線矢印コネクタ 53"/>
           <p:cNvCxnSpPr>
             <a:stCxn id="8" idx="2"/>
@@ -3475,8 +3598,8 @@
         </p:nvCxnSpPr>
         <p:spPr>
           <a:xfrm>
-            <a:off x="3937801" y="3975860"/>
-            <a:ext cx="1487715" cy="1785248"/>
+            <a:off x="3580918" y="3877881"/>
+            <a:ext cx="2387462" cy="1635596"/>
           </a:xfrm>
           <a:prstGeom prst="straightConnector1">
             <a:avLst/>
@@ -3509,8 +3632,8 @@
         </p:nvCxnSpPr>
         <p:spPr>
           <a:xfrm flipV="1">
-            <a:off x="5425516" y="177346"/>
-            <a:ext cx="0" cy="6360886"/>
+            <a:off x="5948992" y="487586"/>
+            <a:ext cx="0" cy="5952668"/>
           </a:xfrm>
           <a:prstGeom prst="straightConnector1">
             <a:avLst/>
@@ -3542,8 +3665,8 @@
         </p:nvCxnSpPr>
         <p:spPr>
           <a:xfrm>
-            <a:off x="3937801" y="177346"/>
-            <a:ext cx="0" cy="6360886"/>
+            <a:off x="3598511" y="477891"/>
+            <a:ext cx="0" cy="5952668"/>
           </a:xfrm>
           <a:prstGeom prst="straightConnector1">
             <a:avLst/>
@@ -3569,58 +3692,14 @@
       </p:cxnSp>
       <p:sp>
         <p:nvSpPr>
-          <p:cNvPr id="4" name="正方形/長方形 3"/>
-          <p:cNvSpPr/>
-          <p:nvPr/>
-        </p:nvSpPr>
-        <p:spPr>
-          <a:xfrm>
-            <a:off x="3259264" y="1161167"/>
-            <a:ext cx="1324429" cy="317500"/>
-          </a:xfrm>
-          <a:prstGeom prst="rect">
-            <a:avLst/>
-          </a:prstGeom>
-        </p:spPr>
-        <p:style>
-          <a:lnRef idx="2">
-            <a:schemeClr val="accent4">
-              <a:shade val="50000"/>
-            </a:schemeClr>
-          </a:lnRef>
-          <a:fillRef idx="1">
-            <a:schemeClr val="accent4"/>
-          </a:fillRef>
-          <a:effectRef idx="0">
-            <a:schemeClr val="accent4"/>
-          </a:effectRef>
-          <a:fontRef idx="minor">
-            <a:schemeClr val="lt1"/>
-          </a:fontRef>
-        </p:style>
-        <p:txBody>
-          <a:bodyPr rtlCol="0" anchor="ctr"/>
-          <a:lstStyle/>
-          <a:p>
-            <a:pPr algn="ctr"/>
-            <a:r>
-              <a:rPr lang="en-US" altLang="ja-JP" sz="1000" dirty="0" err="1" smtClean="0"/>
-              <a:t>FlashSocketPolicy</a:t>
-            </a:r>
-            <a:endParaRPr kumimoji="1" lang="ja-JP" altLang="en-US" sz="1000" dirty="0"/>
-          </a:p>
-        </p:txBody>
-      </p:sp>
-      <p:sp>
-        <p:nvSpPr>
           <p:cNvPr id="7" name="正方形/長方形 6"/>
           <p:cNvSpPr/>
           <p:nvPr/>
         </p:nvSpPr>
         <p:spPr>
           <a:xfrm>
-            <a:off x="3259264" y="1558499"/>
-            <a:ext cx="1324429" cy="317500"/>
+            <a:off x="2878132" y="1460520"/>
+            <a:ext cx="1418831" cy="317500"/>
           </a:xfrm>
           <a:prstGeom prst="rect">
             <a:avLst/>
@@ -3663,8 +3742,8 @@
         </p:nvSpPr>
         <p:spPr>
           <a:xfrm>
-            <a:off x="3275586" y="3658360"/>
-            <a:ext cx="1324429" cy="317500"/>
+            <a:off x="2871502" y="3560381"/>
+            <a:ext cx="1418831" cy="317500"/>
           </a:xfrm>
           <a:prstGeom prst="rect">
             <a:avLst/>
@@ -3705,8 +3784,8 @@
         </p:nvSpPr>
         <p:spPr>
           <a:xfrm>
-            <a:off x="4754229" y="1150280"/>
-            <a:ext cx="1324429" cy="317500"/>
+            <a:off x="5196061" y="1460520"/>
+            <a:ext cx="1425461" cy="317500"/>
           </a:xfrm>
           <a:prstGeom prst="rect">
             <a:avLst/>
@@ -3749,8 +3828,8 @@
         </p:nvSpPr>
         <p:spPr>
           <a:xfrm>
-            <a:off x="4754229" y="3658360"/>
-            <a:ext cx="1324429" cy="317500"/>
+            <a:off x="5196061" y="3968600"/>
+            <a:ext cx="1425461" cy="317500"/>
           </a:xfrm>
           <a:prstGeom prst="rect">
             <a:avLst/>
@@ -3791,8 +3870,8 @@
         </p:nvSpPr>
         <p:spPr>
           <a:xfrm>
-            <a:off x="3259262" y="2795860"/>
-            <a:ext cx="1324429" cy="317500"/>
+            <a:off x="2878130" y="2697881"/>
+            <a:ext cx="1418831" cy="317500"/>
           </a:xfrm>
           <a:prstGeom prst="rect">
             <a:avLst/>
@@ -3833,8 +3912,8 @@
         </p:nvSpPr>
         <p:spPr>
           <a:xfrm>
-            <a:off x="3275586" y="4113368"/>
-            <a:ext cx="1324429" cy="317500"/>
+            <a:off x="2871502" y="4015389"/>
+            <a:ext cx="1418831" cy="317500"/>
           </a:xfrm>
           <a:prstGeom prst="rect">
             <a:avLst/>
@@ -3875,27 +3954,22 @@
         </p:nvSpPr>
         <p:spPr>
           <a:xfrm>
-            <a:off x="3259264" y="5381211"/>
-            <a:ext cx="1324429" cy="317500"/>
+            <a:off x="2871502" y="5283232"/>
+            <a:ext cx="1418831" cy="317500"/>
           </a:xfrm>
           <a:prstGeom prst="rect">
             <a:avLst/>
           </a:prstGeom>
-          <a:solidFill>
-            <a:srgbClr val="008000"/>
-          </a:solidFill>
         </p:spPr>
         <p:style>
-          <a:lnRef idx="2">
-            <a:schemeClr val="accent2">
-              <a:shade val="50000"/>
-            </a:schemeClr>
+          <a:lnRef idx="1">
+            <a:schemeClr val="dk1"/>
           </a:lnRef>
-          <a:fillRef idx="1">
-            <a:schemeClr val="accent2"/>
+          <a:fillRef idx="3">
+            <a:schemeClr val="dk1"/>
           </a:fillRef>
-          <a:effectRef idx="0">
-            <a:schemeClr val="accent2"/>
+          <a:effectRef idx="2">
+            <a:schemeClr val="dk1"/>
           </a:effectRef>
           <a:fontRef idx="minor">
             <a:schemeClr val="lt1"/>
@@ -3922,8 +3996,8 @@
         </p:nvSpPr>
         <p:spPr>
           <a:xfrm>
-            <a:off x="3259264" y="745128"/>
-            <a:ext cx="2819394" cy="317500"/>
+            <a:off x="2878132" y="1055368"/>
+            <a:ext cx="3743390" cy="317500"/>
           </a:xfrm>
           <a:prstGeom prst="rect">
             <a:avLst/>
@@ -3966,8 +4040,8 @@
         </p:nvSpPr>
         <p:spPr>
           <a:xfrm>
-            <a:off x="3259262" y="1999475"/>
-            <a:ext cx="1324429" cy="317500"/>
+            <a:off x="2878130" y="1901496"/>
+            <a:ext cx="1418831" cy="317500"/>
           </a:xfrm>
           <a:prstGeom prst="rect">
             <a:avLst/>
@@ -4010,8 +4084,8 @@
         </p:nvSpPr>
         <p:spPr>
           <a:xfrm>
-            <a:off x="3275586" y="4542045"/>
-            <a:ext cx="1324429" cy="317500"/>
+            <a:off x="2871502" y="4444066"/>
+            <a:ext cx="1418831" cy="317500"/>
           </a:xfrm>
           <a:prstGeom prst="rect">
             <a:avLst/>
@@ -4052,8 +4126,8 @@
         </p:nvSpPr>
         <p:spPr>
           <a:xfrm>
-            <a:off x="3259262" y="4941316"/>
-            <a:ext cx="1324429" cy="317500"/>
+            <a:off x="2878130" y="4843337"/>
+            <a:ext cx="1418831" cy="317500"/>
           </a:xfrm>
           <a:prstGeom prst="rect">
             <a:avLst/>
@@ -4094,8 +4168,8 @@
         </p:nvSpPr>
         <p:spPr>
           <a:xfrm>
-            <a:off x="4770552" y="4113368"/>
-            <a:ext cx="1324429" cy="317500"/>
+            <a:off x="5212384" y="4423608"/>
+            <a:ext cx="1425461" cy="317500"/>
           </a:xfrm>
           <a:prstGeom prst="rect">
             <a:avLst/>
@@ -4136,8 +4210,8 @@
         </p:nvSpPr>
         <p:spPr>
           <a:xfrm>
-            <a:off x="4754229" y="1998311"/>
-            <a:ext cx="1324429" cy="317500"/>
+            <a:off x="5196061" y="2308551"/>
+            <a:ext cx="1425461" cy="317500"/>
           </a:xfrm>
           <a:prstGeom prst="rect">
             <a:avLst/>
@@ -4180,8 +4254,8 @@
         </p:nvSpPr>
         <p:spPr>
           <a:xfrm>
-            <a:off x="4754229" y="4575256"/>
-            <a:ext cx="1324429" cy="317500"/>
+            <a:off x="5196061" y="4885496"/>
+            <a:ext cx="1425461" cy="317500"/>
           </a:xfrm>
           <a:prstGeom prst="rect">
             <a:avLst/>
@@ -4226,7 +4300,7 @@
         </p:nvSpPr>
         <p:spPr>
           <a:xfrm>
-            <a:off x="3259262" y="177346"/>
+            <a:off x="2871502" y="477891"/>
             <a:ext cx="1324429" cy="523220"/>
           </a:xfrm>
           <a:prstGeom prst="rect">
@@ -4264,7 +4338,7 @@
         </p:nvSpPr>
         <p:spPr>
           <a:xfrm>
-            <a:off x="4754229" y="177346"/>
+            <a:off x="5297093" y="487586"/>
             <a:ext cx="1324429" cy="523220"/>
           </a:xfrm>
           <a:prstGeom prst="rect">
@@ -4302,7 +4376,7 @@
         </p:nvSpPr>
         <p:spPr>
           <a:xfrm>
-            <a:off x="639807" y="5148045"/>
+            <a:off x="258675" y="5127626"/>
             <a:ext cx="1746780" cy="646002"/>
           </a:xfrm>
           <a:prstGeom prst="wedgeRoundRectCallout">
@@ -4357,7 +4431,7 @@
         </p:nvSpPr>
         <p:spPr>
           <a:xfrm>
-            <a:off x="6094981" y="5918730"/>
+            <a:off x="11559" y="0"/>
             <a:ext cx="2866571" cy="809870"/>
           </a:xfrm>
         </p:spPr>
@@ -4398,13 +4472,13 @@
         </p:nvSpPr>
         <p:spPr>
           <a:xfrm>
-            <a:off x="639807" y="1999475"/>
-            <a:ext cx="1746780" cy="1032150"/>
+            <a:off x="258675" y="1306278"/>
+            <a:ext cx="1746780" cy="1302468"/>
           </a:xfrm>
           <a:prstGeom prst="wedgeRoundRectCallout">
             <a:avLst>
               <a:gd name="adj1" fmla="val 97394"/>
-              <a:gd name="adj2" fmla="val -33729"/>
+              <a:gd name="adj2" fmla="val 8756"/>
               <a:gd name="adj3" fmla="val 16667"/>
             </a:avLst>
           </a:prstGeom>
@@ -4451,6 +4525,22 @@
               <a:rPr lang="en-US" altLang="ja-JP" sz="1200" dirty="0" err="1" smtClean="0"/>
               <a:t>HandlerEnv</a:t>
             </a:r>
+            <a:r>
+              <a:rPr lang="en-US" altLang="ja-JP" sz="1200" dirty="0" smtClean="0"/>
+              <a:t>; all </a:t>
+            </a:r>
+            <a:r>
+              <a:rPr lang="en-US" altLang="ja-JP" sz="1200" dirty="0" err="1" smtClean="0"/>
+              <a:t>Xitrum</a:t>
+            </a:r>
+            <a:r>
+              <a:rPr lang="en-US" altLang="ja-JP" sz="1200" dirty="0" smtClean="0"/>
+              <a:t> handlers work with </a:t>
+            </a:r>
+            <a:r>
+              <a:rPr lang="en-US" altLang="ja-JP" sz="1200" dirty="0" err="1" smtClean="0"/>
+              <a:t>HandlerEnv</a:t>
+            </a:r>
             <a:endParaRPr lang="ja-JP" altLang="en-US" sz="1200" dirty="0"/>
           </a:p>
         </p:txBody>
@@ -4463,7 +4553,7 @@
         </p:nvSpPr>
         <p:spPr>
           <a:xfrm>
-            <a:off x="6657410" y="1998311"/>
+            <a:off x="7200274" y="2308551"/>
             <a:ext cx="1727228" cy="797549"/>
           </a:xfrm>
           <a:prstGeom prst="wedgeRoundRectCallout">
@@ -4510,66 +4600,23 @@
             </a:r>
             <a:r>
               <a:rPr lang="en-US" altLang="ja-JP" sz="1200" dirty="0" smtClean="0"/>
-              <a:t> to </a:t>
+              <a:t> </a:t>
+            </a:r>
+            <a:r>
+              <a:rPr lang="en-US" altLang="ja-JP" sz="1200" dirty="0" smtClean="0"/>
+              <a:t>to </a:t>
+            </a:r>
+            <a:r>
+              <a:rPr lang="en-US" altLang="ja-JP" sz="1200" dirty="0" err="1" smtClean="0"/>
+              <a:t>Netty’s</a:t>
+            </a:r>
+            <a:r>
+              <a:rPr lang="en-US" altLang="ja-JP" sz="1200" dirty="0" smtClean="0"/>
+              <a:t> </a:t>
             </a:r>
             <a:r>
               <a:rPr lang="en-US" altLang="ja-JP" sz="1200" dirty="0" err="1" smtClean="0"/>
               <a:t>FullHttpResponse</a:t>
-            </a:r>
-            <a:endParaRPr lang="ja-JP" altLang="en-US" sz="1200" dirty="0"/>
-          </a:p>
-        </p:txBody>
-      </p:sp>
-      <p:sp>
-        <p:nvSpPr>
-          <p:cNvPr id="57" name="角丸四角形吹き出し 56"/>
-          <p:cNvSpPr/>
-          <p:nvPr/>
-        </p:nvSpPr>
-        <p:spPr>
-          <a:xfrm>
-            <a:off x="6657410" y="4217325"/>
-            <a:ext cx="1727228" cy="592435"/>
-          </a:xfrm>
-          <a:prstGeom prst="wedgeRoundRectCallout">
-            <a:avLst>
-              <a:gd name="adj1" fmla="val -132975"/>
-              <a:gd name="adj2" fmla="val 142089"/>
-              <a:gd name="adj3" fmla="val 16667"/>
-            </a:avLst>
-          </a:prstGeom>
-        </p:spPr>
-        <p:style>
-          <a:lnRef idx="1">
-            <a:schemeClr val="dk1"/>
-          </a:lnRef>
-          <a:fillRef idx="2">
-            <a:schemeClr val="dk1"/>
-          </a:fillRef>
-          <a:effectRef idx="1">
-            <a:schemeClr val="dk1"/>
-          </a:effectRef>
-          <a:fontRef idx="minor">
-            <a:schemeClr val="dk1"/>
-          </a:fontRef>
-        </p:style>
-        <p:txBody>
-          <a:bodyPr rtlCol="0" anchor="ctr"/>
-          <a:lstStyle/>
-          <a:p>
-            <a:r>
-              <a:rPr lang="en-US" altLang="ja-JP" sz="1200" dirty="0" smtClean="0"/>
-              <a:t>Shortcut may happen</a:t>
-            </a:r>
-          </a:p>
-          <a:p>
-            <a:r>
-              <a:rPr lang="en-US" altLang="ja-JP" sz="1200" dirty="0" smtClean="0"/>
-              <a:t>(action </a:t>
-            </a:r>
-            <a:r>
-              <a:rPr lang="en-US" altLang="ja-JP" sz="1200" dirty="0" smtClean="0"/>
-              <a:t>is not called)</a:t>
             </a:r>
             <a:endParaRPr lang="ja-JP" altLang="en-US" sz="1200" dirty="0"/>
           </a:p>
@@ -4583,8 +4630,8 @@
         </p:nvSpPr>
         <p:spPr>
           <a:xfrm>
-            <a:off x="3259264" y="2389225"/>
-            <a:ext cx="1324429" cy="317500"/>
+            <a:off x="2878132" y="2291246"/>
+            <a:ext cx="1418831" cy="317500"/>
           </a:xfrm>
           <a:prstGeom prst="rect">
             <a:avLst/>
@@ -4625,8 +4672,8 @@
         </p:nvSpPr>
         <p:spPr>
           <a:xfrm>
-            <a:off x="3259262" y="3234914"/>
-            <a:ext cx="1324429" cy="317500"/>
+            <a:off x="2878130" y="3136935"/>
+            <a:ext cx="1418831" cy="317500"/>
           </a:xfrm>
           <a:prstGeom prst="rect">
             <a:avLst/>
@@ -4667,27 +4714,22 @@
         </p:nvSpPr>
         <p:spPr>
           <a:xfrm>
-            <a:off x="3275586" y="5833381"/>
-            <a:ext cx="1324429" cy="317500"/>
+            <a:off x="2871502" y="5725153"/>
+            <a:ext cx="1418831" cy="317500"/>
           </a:xfrm>
           <a:prstGeom prst="rect">
             <a:avLst/>
           </a:prstGeom>
-          <a:solidFill>
-            <a:schemeClr val="accent2">
-              <a:lumMod val="75000"/>
-            </a:schemeClr>
-          </a:solidFill>
         </p:spPr>
         <p:style>
           <a:lnRef idx="1">
-            <a:schemeClr val="accent1"/>
+            <a:schemeClr val="accent2"/>
           </a:lnRef>
           <a:fillRef idx="3">
-            <a:schemeClr val="accent1"/>
+            <a:schemeClr val="accent2"/>
           </a:fillRef>
           <a:effectRef idx="2">
-            <a:schemeClr val="accent1"/>
+            <a:schemeClr val="accent2"/>
           </a:effectRef>
           <a:fontRef idx="minor">
             <a:schemeClr val="lt1"/>
@@ -4714,8 +4756,8 @@
         </p:nvSpPr>
         <p:spPr>
           <a:xfrm>
-            <a:off x="4754229" y="1568064"/>
-            <a:ext cx="1324429" cy="317500"/>
+            <a:off x="5196061" y="1878304"/>
+            <a:ext cx="1425461" cy="317500"/>
           </a:xfrm>
           <a:prstGeom prst="rect">
             <a:avLst/>
@@ -4759,8 +4801,8 @@
         </p:nvSpPr>
         <p:spPr>
           <a:xfrm>
-            <a:off x="4770552" y="2398053"/>
-            <a:ext cx="1324429" cy="317500"/>
+            <a:off x="5196062" y="2708293"/>
+            <a:ext cx="1425460" cy="317500"/>
           </a:xfrm>
           <a:prstGeom prst="rect">
             <a:avLst/>
@@ -4801,8 +4843,8 @@
         </p:nvSpPr>
         <p:spPr>
           <a:xfrm>
-            <a:off x="4754229" y="2795860"/>
-            <a:ext cx="1324429" cy="317500"/>
+            <a:off x="5196061" y="3106100"/>
+            <a:ext cx="1425461" cy="317500"/>
           </a:xfrm>
           <a:prstGeom prst="rect">
             <a:avLst/>
@@ -4843,8 +4885,8 @@
         </p:nvSpPr>
         <p:spPr>
           <a:xfrm>
-            <a:off x="4770552" y="3234914"/>
-            <a:ext cx="1324429" cy="317500"/>
+            <a:off x="5196062" y="3545154"/>
+            <a:ext cx="1425460" cy="317500"/>
           </a:xfrm>
           <a:prstGeom prst="rect">
             <a:avLst/>
@@ -4885,7 +4927,7 @@
         </p:nvSpPr>
         <p:spPr>
           <a:xfrm>
-            <a:off x="639807" y="6105675"/>
+            <a:off x="258675" y="6007696"/>
             <a:ext cx="1746780" cy="432558"/>
           </a:xfrm>
           <a:prstGeom prst="wedgeRoundRectCallout">
@@ -4930,7 +4972,7 @@
         </p:nvSpPr>
         <p:spPr>
           <a:xfrm>
-            <a:off x="639807" y="3234914"/>
+            <a:off x="258675" y="3136935"/>
             <a:ext cx="1746780" cy="535231"/>
           </a:xfrm>
           <a:prstGeom prst="wedgeRoundRectCallout">
@@ -4975,7 +5017,7 @@
         </p:nvSpPr>
         <p:spPr>
           <a:xfrm>
-            <a:off x="639807" y="4274429"/>
+            <a:off x="258675" y="4176450"/>
             <a:ext cx="1746780" cy="535231"/>
           </a:xfrm>
           <a:prstGeom prst="wedgeRoundRectCallout">
@@ -5026,59 +5068,14 @@
       </p:sp>
       <p:sp>
         <p:nvSpPr>
-          <p:cNvPr id="56" name="角丸四角形吹き出し 55"/>
-          <p:cNvSpPr/>
-          <p:nvPr/>
-        </p:nvSpPr>
-        <p:spPr>
-          <a:xfrm>
-            <a:off x="639807" y="862855"/>
-            <a:ext cx="1746780" cy="695644"/>
-          </a:xfrm>
-          <a:prstGeom prst="wedgeRoundRectCallout">
-            <a:avLst>
-              <a:gd name="adj1" fmla="val 97637"/>
-              <a:gd name="adj2" fmla="val 8343"/>
-              <a:gd name="adj3" fmla="val 16667"/>
-            </a:avLst>
-          </a:prstGeom>
-        </p:spPr>
-        <p:style>
-          <a:lnRef idx="1">
-            <a:schemeClr val="dk1"/>
-          </a:lnRef>
-          <a:fillRef idx="2">
-            <a:schemeClr val="dk1"/>
-          </a:fillRef>
-          <a:effectRef idx="1">
-            <a:schemeClr val="dk1"/>
-          </a:effectRef>
-          <a:fontRef idx="minor">
-            <a:schemeClr val="dk1"/>
-          </a:fontRef>
-        </p:style>
-        <p:txBody>
-          <a:bodyPr rtlCol="0" anchor="ctr"/>
-          <a:lstStyle/>
-          <a:p>
-            <a:r>
-              <a:rPr lang="en-US" altLang="ja-JP" sz="1200" dirty="0" smtClean="0"/>
-              <a:t>Adobe Flash policy file can be served on the same port with HTTP</a:t>
-            </a:r>
-            <a:endParaRPr lang="ja-JP" altLang="en-US" sz="1200" dirty="0"/>
-          </a:p>
-        </p:txBody>
-      </p:sp>
-      <p:sp>
-        <p:nvSpPr>
           <p:cNvPr id="58" name="角丸四角形吹き出し 57"/>
           <p:cNvSpPr/>
           <p:nvPr/>
         </p:nvSpPr>
         <p:spPr>
           <a:xfrm>
-            <a:off x="6657410" y="795012"/>
-            <a:ext cx="1727228" cy="535231"/>
+            <a:off x="7200274" y="1055368"/>
+            <a:ext cx="1727228" cy="846128"/>
           </a:xfrm>
           <a:prstGeom prst="wedgeRoundRectCallout">
             <a:avLst>
@@ -5115,6 +5112,205 @@
             <a:r>
               <a:rPr lang="en-US" altLang="ja-JP" sz="1200" dirty="0" err="1" smtClean="0"/>
               <a:t>Netty</a:t>
+            </a:r>
+            <a:r>
+              <a:rPr lang="en-US" altLang="ja-JP" sz="1200" dirty="0" smtClean="0"/>
+              <a:t>; the others are created by </a:t>
+            </a:r>
+            <a:r>
+              <a:rPr lang="en-US" altLang="ja-JP" sz="1200" dirty="0" err="1" smtClean="0"/>
+              <a:t>Xitrum</a:t>
+            </a:r>
+            <a:endParaRPr lang="ja-JP" altLang="en-US" sz="1200" dirty="0"/>
+          </a:p>
+        </p:txBody>
+      </p:sp>
+      <p:cxnSp>
+        <p:nvCxnSpPr>
+          <p:cNvPr id="44" name="直線矢印コネクタ 43"/>
+          <p:cNvCxnSpPr>
+            <a:stCxn id="18" idx="3"/>
+          </p:cNvCxnSpPr>
+          <p:nvPr/>
+        </p:nvCxnSpPr>
+        <p:spPr>
+          <a:xfrm>
+            <a:off x="4290333" y="5441982"/>
+            <a:ext cx="404696" cy="748846"/>
+          </a:xfrm>
+          <a:prstGeom prst="straightConnector1">
+            <a:avLst/>
+          </a:prstGeom>
+          <a:ln>
+            <a:prstDash val="dash"/>
+            <a:tailEnd type="arrow"/>
+          </a:ln>
+        </p:spPr>
+        <p:style>
+          <a:lnRef idx="1">
+            <a:schemeClr val="dk1"/>
+          </a:lnRef>
+          <a:fillRef idx="0">
+            <a:schemeClr val="dk1"/>
+          </a:fillRef>
+          <a:effectRef idx="0">
+            <a:schemeClr val="dk1"/>
+          </a:effectRef>
+          <a:fontRef idx="minor">
+            <a:schemeClr val="tx1"/>
+          </a:fontRef>
+        </p:style>
+      </p:cxnSp>
+      <p:sp>
+        <p:nvSpPr>
+          <p:cNvPr id="50" name="正方形/長方形 49"/>
+          <p:cNvSpPr/>
+          <p:nvPr/>
+        </p:nvSpPr>
+        <p:spPr>
+          <a:xfrm>
+            <a:off x="4375541" y="6190828"/>
+            <a:ext cx="1324429" cy="317500"/>
+          </a:xfrm>
+          <a:prstGeom prst="rect">
+            <a:avLst/>
+          </a:prstGeom>
+        </p:spPr>
+        <p:style>
+          <a:lnRef idx="2">
+            <a:schemeClr val="accent6">
+              <a:shade val="50000"/>
+            </a:schemeClr>
+          </a:lnRef>
+          <a:fillRef idx="1">
+            <a:schemeClr val="accent6"/>
+          </a:fillRef>
+          <a:effectRef idx="0">
+            <a:schemeClr val="accent6"/>
+          </a:effectRef>
+          <a:fontRef idx="minor">
+            <a:schemeClr val="lt1"/>
+          </a:fontRef>
+        </p:style>
+        <p:txBody>
+          <a:bodyPr rtlCol="0" anchor="ctr"/>
+          <a:lstStyle/>
+          <a:p>
+            <a:pPr algn="ctr"/>
+            <a:r>
+              <a:rPr lang="en-US" altLang="ja-JP" sz="1000" dirty="0" err="1" smtClean="0"/>
+              <a:t>Action#execute</a:t>
+            </a:r>
+            <a:endParaRPr kumimoji="1" lang="ja-JP" altLang="en-US" sz="1000" dirty="0"/>
+          </a:p>
+        </p:txBody>
+      </p:sp>
+      <p:cxnSp>
+        <p:nvCxnSpPr>
+          <p:cNvPr id="55" name="直線矢印コネクタ 54"/>
+          <p:cNvCxnSpPr/>
+          <p:nvPr/>
+        </p:nvCxnSpPr>
+        <p:spPr>
+          <a:xfrm flipV="1">
+            <a:off x="5428720" y="5836390"/>
+            <a:ext cx="539660" cy="354438"/>
+          </a:xfrm>
+          <a:prstGeom prst="straightConnector1">
+            <a:avLst/>
+          </a:prstGeom>
+          <a:ln>
+            <a:prstDash val="dash"/>
+            <a:tailEnd type="arrow"/>
+          </a:ln>
+        </p:spPr>
+        <p:style>
+          <a:lnRef idx="1">
+            <a:schemeClr val="dk1"/>
+          </a:lnRef>
+          <a:fillRef idx="0">
+            <a:schemeClr val="dk1"/>
+          </a:fillRef>
+          <a:effectRef idx="0">
+            <a:schemeClr val="dk1"/>
+          </a:effectRef>
+          <a:fontRef idx="minor">
+            <a:schemeClr val="tx1"/>
+          </a:fontRef>
+        </p:style>
+      </p:cxnSp>
+      <p:sp>
+        <p:nvSpPr>
+          <p:cNvPr id="59" name="角丸四角形吹き出し 58"/>
+          <p:cNvSpPr/>
+          <p:nvPr/>
+        </p:nvSpPr>
+        <p:spPr>
+          <a:xfrm>
+            <a:off x="7200274" y="5725153"/>
+            <a:ext cx="1727228" cy="874978"/>
+          </a:xfrm>
+          <a:prstGeom prst="wedgeRoundRectCallout">
+            <a:avLst>
+              <a:gd name="adj1" fmla="val -134097"/>
+              <a:gd name="adj2" fmla="val -11073"/>
+              <a:gd name="adj3" fmla="val 16667"/>
+            </a:avLst>
+          </a:prstGeom>
+        </p:spPr>
+        <p:style>
+          <a:lnRef idx="1">
+            <a:schemeClr val="dk1"/>
+          </a:lnRef>
+          <a:fillRef idx="2">
+            <a:schemeClr val="dk1"/>
+          </a:fillRef>
+          <a:effectRef idx="1">
+            <a:schemeClr val="dk1"/>
+          </a:effectRef>
+          <a:fontRef idx="minor">
+            <a:schemeClr val="dk1"/>
+          </a:fontRef>
+        </p:style>
+        <p:txBody>
+          <a:bodyPr rtlCol="0" anchor="ctr"/>
+          <a:lstStyle/>
+          <a:p>
+            <a:r>
+              <a:rPr lang="en-US" altLang="ja-JP" sz="1200" dirty="0" err="1" smtClean="0"/>
+              <a:t>respondText</a:t>
+            </a:r>
+            <a:r>
+              <a:rPr lang="en-US" altLang="ja-JP" sz="1200" dirty="0" smtClean="0"/>
+              <a:t>, </a:t>
+            </a:r>
+            <a:r>
+              <a:rPr lang="en-US" altLang="ja-JP" sz="1200" dirty="0" err="1" smtClean="0"/>
+              <a:t>respondView</a:t>
+            </a:r>
+            <a:r>
+              <a:rPr lang="en-US" altLang="ja-JP" sz="1200" dirty="0" smtClean="0"/>
+              <a:t>,</a:t>
+            </a:r>
+          </a:p>
+          <a:p>
+            <a:r>
+              <a:rPr lang="en-US" altLang="ja-JP" sz="1200" dirty="0" err="1" smtClean="0"/>
+              <a:t>respondFile</a:t>
+            </a:r>
+            <a:r>
+              <a:rPr lang="en-US" altLang="ja-JP" sz="1200" dirty="0" smtClean="0"/>
+              <a:t>,</a:t>
+            </a:r>
+          </a:p>
+          <a:p>
+            <a:r>
+              <a:rPr lang="en-US" altLang="ja-JP" sz="1200" dirty="0" err="1" smtClean="0"/>
+              <a:t>respondBinary</a:t>
+            </a:r>
+            <a:r>
+              <a:rPr lang="en-US" altLang="ja-JP" sz="1200" dirty="0" smtClean="0"/>
+              <a:t> etc.</a:t>
             </a:r>
             <a:endParaRPr lang="ja-JP" altLang="en-US" sz="1200" dirty="0"/>
           </a:p>

</xml_diff>